<commit_message>
Changes done by Jawad Haider
</commit_message>
<xml_diff>
--- a/Presentation.pptx
+++ b/Presentation.pptx
@@ -813,7 +813,7 @@
   <p:cSld>
     <p:spTree>
       <p:nvGrpSpPr>
-        <p:cNvPr id="114" name="Shape 114"/>
+        <p:cNvPr id="151" name="Shape 151"/>
         <p:cNvGrpSpPr/>
         <p:nvPr/>
       </p:nvGrpSpPr>
@@ -827,7 +827,7 @@
       </p:grpSpPr>
       <p:sp>
         <p:nvSpPr>
-          <p:cNvPr id="115" name="Google Shape;115;g31460f23d03_0_50:notes"/>
+          <p:cNvPr id="152" name="Google Shape;152;g31460f23d03_0_50:notes"/>
           <p:cNvSpPr/>
           <p:nvPr>
             <p:ph idx="2" type="sldImg"/>
@@ -862,7 +862,7 @@
       </p:sp>
       <p:sp>
         <p:nvSpPr>
-          <p:cNvPr id="116" name="Google Shape;116;g31460f23d03_0_50:notes"/>
+          <p:cNvPr id="153" name="Google Shape;153;g31460f23d03_0_50:notes"/>
           <p:cNvSpPr txBox="1"/>
           <p:nvPr>
             <p:ph idx="1" type="body"/>
@@ -1110,7 +1110,7 @@
   <p:cSld>
     <p:spTree>
       <p:nvGrpSpPr>
-        <p:cNvPr id="78" name="Shape 78"/>
+        <p:cNvPr id="83" name="Shape 83"/>
         <p:cNvGrpSpPr/>
         <p:nvPr/>
       </p:nvGrpSpPr>
@@ -1124,7 +1124,7 @@
       </p:grpSpPr>
       <p:sp>
         <p:nvSpPr>
-          <p:cNvPr id="79" name="Google Shape;79;g31460f23d03_0_10:notes"/>
+          <p:cNvPr id="84" name="Google Shape;84;g31460f23d03_0_10:notes"/>
           <p:cNvSpPr/>
           <p:nvPr>
             <p:ph idx="2" type="sldImg"/>
@@ -1159,7 +1159,7 @@
       </p:sp>
       <p:sp>
         <p:nvSpPr>
-          <p:cNvPr id="80" name="Google Shape;80;g31460f23d03_0_10:notes"/>
+          <p:cNvPr id="85" name="Google Shape;85;g31460f23d03_0_10:notes"/>
           <p:cNvSpPr txBox="1"/>
           <p:nvPr>
             <p:ph idx="1" type="body"/>
@@ -1209,7 +1209,7 @@
   <p:cSld>
     <p:spTree>
       <p:nvGrpSpPr>
-        <p:cNvPr id="84" name="Shape 84"/>
+        <p:cNvPr id="89" name="Shape 89"/>
         <p:cNvGrpSpPr/>
         <p:nvPr/>
       </p:nvGrpSpPr>
@@ -1223,7 +1223,7 @@
       </p:grpSpPr>
       <p:sp>
         <p:nvSpPr>
-          <p:cNvPr id="85" name="Google Shape;85;g31460f23d03_0_17:notes"/>
+          <p:cNvPr id="90" name="Google Shape;90;g31460f23d03_0_17:notes"/>
           <p:cNvSpPr/>
           <p:nvPr>
             <p:ph idx="2" type="sldImg"/>
@@ -1258,7 +1258,7 @@
       </p:sp>
       <p:sp>
         <p:nvSpPr>
-          <p:cNvPr id="86" name="Google Shape;86;g31460f23d03_0_17:notes"/>
+          <p:cNvPr id="91" name="Google Shape;91;g31460f23d03_0_17:notes"/>
           <p:cNvSpPr txBox="1"/>
           <p:nvPr>
             <p:ph idx="1" type="body"/>
@@ -1308,7 +1308,7 @@
   <p:cSld>
     <p:spTree>
       <p:nvGrpSpPr>
-        <p:cNvPr id="90" name="Shape 90"/>
+        <p:cNvPr id="95" name="Shape 95"/>
         <p:cNvGrpSpPr/>
         <p:nvPr/>
       </p:nvGrpSpPr>
@@ -1322,7 +1322,7 @@
       </p:grpSpPr>
       <p:sp>
         <p:nvSpPr>
-          <p:cNvPr id="91" name="Google Shape;91;g31460f23d03_0_24:notes"/>
+          <p:cNvPr id="96" name="Google Shape;96;g31460f23d03_0_24:notes"/>
           <p:cNvSpPr/>
           <p:nvPr>
             <p:ph idx="2" type="sldImg"/>
@@ -1357,7 +1357,7 @@
       </p:sp>
       <p:sp>
         <p:nvSpPr>
-          <p:cNvPr id="92" name="Google Shape;92;g31460f23d03_0_24:notes"/>
+          <p:cNvPr id="97" name="Google Shape;97;g31460f23d03_0_24:notes"/>
           <p:cNvSpPr txBox="1"/>
           <p:nvPr>
             <p:ph idx="1" type="body"/>
@@ -1407,7 +1407,7 @@
   <p:cSld>
     <p:spTree>
       <p:nvGrpSpPr>
-        <p:cNvPr id="96" name="Shape 96"/>
+        <p:cNvPr id="101" name="Shape 101"/>
         <p:cNvGrpSpPr/>
         <p:nvPr/>
       </p:nvGrpSpPr>
@@ -1421,7 +1421,7 @@
       </p:grpSpPr>
       <p:sp>
         <p:nvSpPr>
-          <p:cNvPr id="97" name="Google Shape;97;g31460f23d03_0_32:notes"/>
+          <p:cNvPr id="102" name="Google Shape;102;g31460f23d03_0_32:notes"/>
           <p:cNvSpPr/>
           <p:nvPr>
             <p:ph idx="2" type="sldImg"/>
@@ -1456,7 +1456,7 @@
       </p:sp>
       <p:sp>
         <p:nvSpPr>
-          <p:cNvPr id="98" name="Google Shape;98;g31460f23d03_0_32:notes"/>
+          <p:cNvPr id="103" name="Google Shape;103;g31460f23d03_0_32:notes"/>
           <p:cNvSpPr txBox="1"/>
           <p:nvPr>
             <p:ph idx="1" type="body"/>
@@ -1506,7 +1506,7 @@
   <p:cSld>
     <p:spTree>
       <p:nvGrpSpPr>
-        <p:cNvPr id="102" name="Shape 102"/>
+        <p:cNvPr id="139" name="Shape 139"/>
         <p:cNvGrpSpPr/>
         <p:nvPr/>
       </p:nvGrpSpPr>
@@ -1520,7 +1520,7 @@
       </p:grpSpPr>
       <p:sp>
         <p:nvSpPr>
-          <p:cNvPr id="103" name="Google Shape;103;g314ac7e5d8b_0_7:notes"/>
+          <p:cNvPr id="140" name="Google Shape;140;g314ac7e5d8b_0_7:notes"/>
           <p:cNvSpPr/>
           <p:nvPr>
             <p:ph idx="2" type="sldImg"/>
@@ -1555,7 +1555,7 @@
       </p:sp>
       <p:sp>
         <p:nvSpPr>
-          <p:cNvPr id="104" name="Google Shape;104;g314ac7e5d8b_0_7:notes"/>
+          <p:cNvPr id="141" name="Google Shape;141;g314ac7e5d8b_0_7:notes"/>
           <p:cNvSpPr txBox="1"/>
           <p:nvPr>
             <p:ph idx="1" type="body"/>
@@ -1605,7 +1605,7 @@
   <p:cSld>
     <p:spTree>
       <p:nvGrpSpPr>
-        <p:cNvPr id="108" name="Shape 108"/>
+        <p:cNvPr id="145" name="Shape 145"/>
         <p:cNvGrpSpPr/>
         <p:nvPr/>
       </p:nvGrpSpPr>
@@ -1619,7 +1619,7 @@
       </p:grpSpPr>
       <p:sp>
         <p:nvSpPr>
-          <p:cNvPr id="109" name="Google Shape;109;g314ac7e5d8b_0_14:notes"/>
+          <p:cNvPr id="146" name="Google Shape;146;g314ac7e5d8b_0_14:notes"/>
           <p:cNvSpPr/>
           <p:nvPr>
             <p:ph idx="2" type="sldImg"/>
@@ -1654,7 +1654,7 @@
       </p:sp>
       <p:sp>
         <p:nvSpPr>
-          <p:cNvPr id="110" name="Google Shape;110;g314ac7e5d8b_0_14:notes"/>
+          <p:cNvPr id="147" name="Google Shape;147;g314ac7e5d8b_0_14:notes"/>
           <p:cNvSpPr txBox="1"/>
           <p:nvPr>
             <p:ph idx="1" type="body"/>
@@ -7163,7 +7163,7 @@
   <p:cSld>
     <p:spTree>
       <p:nvGrpSpPr>
-        <p:cNvPr id="117" name="Shape 117"/>
+        <p:cNvPr id="154" name="Shape 154"/>
         <p:cNvGrpSpPr/>
         <p:nvPr/>
       </p:nvGrpSpPr>
@@ -7177,7 +7177,7 @@
       </p:grpSpPr>
       <p:sp>
         <p:nvSpPr>
-          <p:cNvPr id="118" name="Google Shape;118;p22"/>
+          <p:cNvPr id="155" name="Google Shape;155;p22"/>
           <p:cNvSpPr txBox="1"/>
           <p:nvPr>
             <p:ph type="title"/>
@@ -7217,7 +7217,7 @@
       </p:sp>
       <p:sp>
         <p:nvSpPr>
-          <p:cNvPr id="119" name="Google Shape;119;p22"/>
+          <p:cNvPr id="156" name="Google Shape;156;p22"/>
           <p:cNvSpPr txBox="1"/>
           <p:nvPr>
             <p:ph idx="1" type="body"/>
@@ -7705,8 +7705,8 @@
         </p:nvSpPr>
         <p:spPr>
           <a:xfrm>
-            <a:off x="387900" y="1489824"/>
-            <a:ext cx="8368200" cy="3078900"/>
+            <a:off x="387900" y="1489825"/>
+            <a:ext cx="8368200" cy="1824600"/>
           </a:xfrm>
           <a:prstGeom prst="rect">
             <a:avLst/>
@@ -7758,37 +7758,39 @@
             </a:endParaRPr>
           </a:p>
           <a:p>
-            <a:pPr indent="-330200" lvl="0" marL="457200" rtl="0" algn="l">
-              <a:spcBef>
-                <a:spcPts val="0"/>
-              </a:spcBef>
-              <a:spcAft>
-                <a:spcPts val="0"/>
-              </a:spcAft>
-              <a:buClr>
-                <a:schemeClr val="dk1"/>
-              </a:buClr>
-              <a:buSzPts val="1600"/>
-              <a:buAutoNum type="arabicPeriod"/>
+            <a:pPr indent="0" lvl="0" marL="0" rtl="0" algn="l">
+              <a:spcBef>
+                <a:spcPts val="1200"/>
+              </a:spcBef>
+              <a:spcAft>
+                <a:spcPts val="0"/>
+              </a:spcAft>
+              <a:buNone/>
             </a:pPr>
             <a:r>
-              <a:rPr lang="en" sz="1600">
-                <a:solidFill>
-                  <a:schemeClr val="dk1"/>
-                </a:solidFill>
-              </a:rPr>
-              <a:t>It focuses on creating Indexes of documents in the given path and search the query to retrieve the relevant documents.</a:t>
+              <a:t/>
             </a:r>
-            <a:endParaRPr sz="1600">
-              <a:solidFill>
-                <a:schemeClr val="dk1"/>
-              </a:solidFill>
-            </a:endParaRPr>
+            <a:endParaRPr sz="1600"/>
+          </a:p>
+          <a:p>
+            <a:pPr indent="0" lvl="0" marL="0" rtl="0" algn="l">
+              <a:spcBef>
+                <a:spcPts val="1200"/>
+              </a:spcBef>
+              <a:spcAft>
+                <a:spcPts val="0"/>
+              </a:spcAft>
+              <a:buNone/>
+            </a:pPr>
+            <a:r>
+              <a:t/>
+            </a:r>
+            <a:endParaRPr sz="1600"/>
           </a:p>
           <a:p>
             <a:pPr indent="-330200" lvl="0" marL="457200" rtl="0" algn="l">
               <a:spcBef>
-                <a:spcPts val="0"/>
+                <a:spcPts val="1200"/>
               </a:spcBef>
               <a:spcAft>
                 <a:spcPts val="0"/>
@@ -7891,6 +7893,269 @@
           </a:p>
         </p:txBody>
       </p:sp>
+      <p:grpSp>
+        <p:nvGrpSpPr>
+          <p:cNvPr id="78" name="Google Shape;78;p15"/>
+          <p:cNvGrpSpPr/>
+          <p:nvPr/>
+        </p:nvGrpSpPr>
+        <p:grpSpPr>
+          <a:xfrm>
+            <a:off x="707813" y="2276300"/>
+            <a:ext cx="7728375" cy="590900"/>
+            <a:chOff x="509725" y="3530875"/>
+            <a:chExt cx="7728375" cy="590900"/>
+          </a:xfrm>
+        </p:grpSpPr>
+        <p:sp>
+          <p:nvSpPr>
+            <p:cNvPr id="79" name="Google Shape;79;p15"/>
+            <p:cNvSpPr/>
+            <p:nvPr/>
+          </p:nvSpPr>
+          <p:spPr>
+            <a:xfrm>
+              <a:off x="2222098" y="3530875"/>
+              <a:ext cx="2379300" cy="590700"/>
+            </a:xfrm>
+            <a:prstGeom prst="chevron">
+              <a:avLst>
+                <a:gd fmla="val 50000" name="adj"/>
+              </a:avLst>
+            </a:prstGeom>
+            <a:solidFill>
+              <a:srgbClr val="1B786F"/>
+            </a:solidFill>
+            <a:ln>
+              <a:noFill/>
+            </a:ln>
+          </p:spPr>
+          <p:txBody>
+            <a:bodyPr anchorCtr="0" anchor="ctr" bIns="91425" lIns="91425" spcFirstLastPara="1" rIns="91425" wrap="square" tIns="91425">
+              <a:noAutofit/>
+            </a:bodyPr>
+            <a:lstStyle/>
+            <a:p>
+              <a:pPr indent="0" lvl="0" marL="0" rtl="0" algn="ctr">
+                <a:spcBef>
+                  <a:spcPts val="0"/>
+                </a:spcBef>
+                <a:spcAft>
+                  <a:spcPts val="0"/>
+                </a:spcAft>
+                <a:buNone/>
+              </a:pPr>
+              <a:r>
+                <a:rPr lang="en">
+                  <a:solidFill>
+                    <a:srgbClr val="FFFFFF"/>
+                  </a:solidFill>
+                  <a:latin typeface="Roboto"/>
+                  <a:ea typeface="Roboto"/>
+                  <a:cs typeface="Roboto"/>
+                  <a:sym typeface="Roboto"/>
+                </a:rPr>
+                <a:t>Creation of Index</a:t>
+              </a:r>
+              <a:endParaRPr>
+                <a:solidFill>
+                  <a:srgbClr val="FFFFFF"/>
+                </a:solidFill>
+                <a:latin typeface="Roboto"/>
+                <a:ea typeface="Roboto"/>
+                <a:cs typeface="Roboto"/>
+                <a:sym typeface="Roboto"/>
+              </a:endParaRPr>
+            </a:p>
+          </p:txBody>
+        </p:sp>
+        <p:sp>
+          <p:nvSpPr>
+            <p:cNvPr id="80" name="Google Shape;80;p15"/>
+            <p:cNvSpPr/>
+            <p:nvPr/>
+          </p:nvSpPr>
+          <p:spPr>
+            <a:xfrm>
+              <a:off x="4156896" y="3530875"/>
+              <a:ext cx="2379300" cy="590700"/>
+            </a:xfrm>
+            <a:prstGeom prst="chevron">
+              <a:avLst>
+                <a:gd fmla="val 50000" name="adj"/>
+              </a:avLst>
+            </a:prstGeom>
+            <a:solidFill>
+              <a:srgbClr val="1D7E75"/>
+            </a:solidFill>
+            <a:ln>
+              <a:noFill/>
+            </a:ln>
+          </p:spPr>
+          <p:txBody>
+            <a:bodyPr anchorCtr="0" anchor="ctr" bIns="91425" lIns="91425" spcFirstLastPara="1" rIns="91425" wrap="square" tIns="91425">
+              <a:noAutofit/>
+            </a:bodyPr>
+            <a:lstStyle/>
+            <a:p>
+              <a:pPr indent="0" lvl="0" marL="0" rtl="0" algn="ctr">
+                <a:spcBef>
+                  <a:spcPts val="0"/>
+                </a:spcBef>
+                <a:spcAft>
+                  <a:spcPts val="0"/>
+                </a:spcAft>
+                <a:buNone/>
+              </a:pPr>
+              <a:r>
+                <a:rPr lang="en">
+                  <a:solidFill>
+                    <a:srgbClr val="FFFFFF"/>
+                  </a:solidFill>
+                  <a:latin typeface="Roboto"/>
+                  <a:ea typeface="Roboto"/>
+                  <a:cs typeface="Roboto"/>
+                  <a:sym typeface="Roboto"/>
+                </a:rPr>
+                <a:t>Search Query</a:t>
+              </a:r>
+              <a:endParaRPr>
+                <a:solidFill>
+                  <a:srgbClr val="FFFFFF"/>
+                </a:solidFill>
+                <a:latin typeface="Roboto"/>
+                <a:ea typeface="Roboto"/>
+                <a:cs typeface="Roboto"/>
+                <a:sym typeface="Roboto"/>
+              </a:endParaRPr>
+            </a:p>
+          </p:txBody>
+        </p:sp>
+        <p:sp>
+          <p:nvSpPr>
+            <p:cNvPr id="81" name="Google Shape;81;p15"/>
+            <p:cNvSpPr/>
+            <p:nvPr/>
+          </p:nvSpPr>
+          <p:spPr>
+            <a:xfrm>
+              <a:off x="6091900" y="3530875"/>
+              <a:ext cx="2146200" cy="590700"/>
+            </a:xfrm>
+            <a:prstGeom prst="chevron">
+              <a:avLst>
+                <a:gd fmla="val 50000" name="adj"/>
+              </a:avLst>
+            </a:prstGeom>
+            <a:solidFill>
+              <a:srgbClr val="1F887E"/>
+            </a:solidFill>
+            <a:ln>
+              <a:noFill/>
+            </a:ln>
+          </p:spPr>
+          <p:txBody>
+            <a:bodyPr anchorCtr="0" anchor="ctr" bIns="91425" lIns="91425" spcFirstLastPara="1" rIns="91425" wrap="square" tIns="91425">
+              <a:noAutofit/>
+            </a:bodyPr>
+            <a:lstStyle/>
+            <a:p>
+              <a:pPr indent="0" lvl="0" marL="0" rtl="0" algn="ctr">
+                <a:spcBef>
+                  <a:spcPts val="0"/>
+                </a:spcBef>
+                <a:spcAft>
+                  <a:spcPts val="0"/>
+                </a:spcAft>
+                <a:buNone/>
+              </a:pPr>
+              <a:r>
+                <a:rPr lang="en">
+                  <a:solidFill>
+                    <a:srgbClr val="FFFFFF"/>
+                  </a:solidFill>
+                  <a:latin typeface="Roboto"/>
+                  <a:ea typeface="Roboto"/>
+                  <a:cs typeface="Roboto"/>
+                  <a:sym typeface="Roboto"/>
+                </a:rPr>
+                <a:t>Results</a:t>
+              </a:r>
+              <a:endParaRPr>
+                <a:solidFill>
+                  <a:srgbClr val="FFFFFF"/>
+                </a:solidFill>
+                <a:latin typeface="Roboto"/>
+                <a:ea typeface="Roboto"/>
+                <a:cs typeface="Roboto"/>
+                <a:sym typeface="Roboto"/>
+              </a:endParaRPr>
+            </a:p>
+          </p:txBody>
+        </p:sp>
+        <p:sp>
+          <p:nvSpPr>
+            <p:cNvPr id="82" name="Google Shape;82;p15"/>
+            <p:cNvSpPr/>
+            <p:nvPr/>
+          </p:nvSpPr>
+          <p:spPr>
+            <a:xfrm>
+              <a:off x="509725" y="3531075"/>
+              <a:ext cx="2146200" cy="590700"/>
+            </a:xfrm>
+            <a:prstGeom prst="homePlate">
+              <a:avLst>
+                <a:gd fmla="val 50000" name="adj"/>
+              </a:avLst>
+            </a:prstGeom>
+            <a:solidFill>
+              <a:srgbClr val="155B55"/>
+            </a:solidFill>
+            <a:ln>
+              <a:noFill/>
+            </a:ln>
+          </p:spPr>
+          <p:txBody>
+            <a:bodyPr anchorCtr="0" anchor="ctr" bIns="91425" lIns="91425" spcFirstLastPara="1" rIns="91425" wrap="square" tIns="91425">
+              <a:noAutofit/>
+            </a:bodyPr>
+            <a:lstStyle/>
+            <a:p>
+              <a:pPr indent="0" lvl="0" marL="0" rtl="0" algn="ctr">
+                <a:spcBef>
+                  <a:spcPts val="0"/>
+                </a:spcBef>
+                <a:spcAft>
+                  <a:spcPts val="0"/>
+                </a:spcAft>
+                <a:buNone/>
+              </a:pPr>
+              <a:r>
+                <a:rPr lang="en">
+                  <a:solidFill>
+                    <a:srgbClr val="FFFFFF"/>
+                  </a:solidFill>
+                  <a:latin typeface="Roboto"/>
+                  <a:ea typeface="Roboto"/>
+                  <a:cs typeface="Roboto"/>
+                  <a:sym typeface="Roboto"/>
+                </a:rPr>
+                <a:t>File Reading</a:t>
+              </a:r>
+              <a:endParaRPr>
+                <a:solidFill>
+                  <a:srgbClr val="FFFFFF"/>
+                </a:solidFill>
+                <a:latin typeface="Roboto"/>
+                <a:ea typeface="Roboto"/>
+                <a:cs typeface="Roboto"/>
+                <a:sym typeface="Roboto"/>
+              </a:endParaRPr>
+            </a:p>
+          </p:txBody>
+        </p:sp>
+      </p:grpSp>
     </p:spTree>
   </p:cSld>
   <p:clrMapOvr>
@@ -7904,7 +8169,7 @@
   <p:cSld>
     <p:spTree>
       <p:nvGrpSpPr>
-        <p:cNvPr id="81" name="Shape 81"/>
+        <p:cNvPr id="86" name="Shape 86"/>
         <p:cNvGrpSpPr/>
         <p:nvPr/>
       </p:nvGrpSpPr>
@@ -7918,7 +8183,7 @@
       </p:grpSpPr>
       <p:sp>
         <p:nvSpPr>
-          <p:cNvPr id="82" name="Google Shape;82;p16"/>
+          <p:cNvPr id="87" name="Google Shape;87;p16"/>
           <p:cNvSpPr txBox="1"/>
           <p:nvPr>
             <p:ph type="title"/>
@@ -7958,7 +8223,7 @@
       </p:sp>
       <p:sp>
         <p:nvSpPr>
-          <p:cNvPr id="83" name="Google Shape;83;p16"/>
+          <p:cNvPr id="88" name="Google Shape;88;p16"/>
           <p:cNvSpPr txBox="1"/>
           <p:nvPr>
             <p:ph idx="1" type="body"/>
@@ -8149,7 +8414,7 @@
   <p:cSld>
     <p:spTree>
       <p:nvGrpSpPr>
-        <p:cNvPr id="87" name="Shape 87"/>
+        <p:cNvPr id="92" name="Shape 92"/>
         <p:cNvGrpSpPr/>
         <p:nvPr/>
       </p:nvGrpSpPr>
@@ -8163,7 +8428,7 @@
       </p:grpSpPr>
       <p:sp>
         <p:nvSpPr>
-          <p:cNvPr id="88" name="Google Shape;88;p17"/>
+          <p:cNvPr id="93" name="Google Shape;93;p17"/>
           <p:cNvSpPr txBox="1"/>
           <p:nvPr>
             <p:ph type="title"/>
@@ -8203,7 +8468,7 @@
       </p:sp>
       <p:sp>
         <p:nvSpPr>
-          <p:cNvPr id="89" name="Google Shape;89;p17"/>
+          <p:cNvPr id="94" name="Google Shape;94;p17"/>
           <p:cNvSpPr txBox="1"/>
           <p:nvPr>
             <p:ph idx="1" type="body"/>
@@ -8415,7 +8680,7 @@
   <p:cSld>
     <p:spTree>
       <p:nvGrpSpPr>
-        <p:cNvPr id="93" name="Shape 93"/>
+        <p:cNvPr id="98" name="Shape 98"/>
         <p:cNvGrpSpPr/>
         <p:nvPr/>
       </p:nvGrpSpPr>
@@ -8429,7 +8694,7 @@
       </p:grpSpPr>
       <p:sp>
         <p:nvSpPr>
-          <p:cNvPr id="94" name="Google Shape;94;p18"/>
+          <p:cNvPr id="99" name="Google Shape;99;p18"/>
           <p:cNvSpPr txBox="1"/>
           <p:nvPr>
             <p:ph type="title"/>
@@ -8469,7 +8734,7 @@
       </p:sp>
       <p:sp>
         <p:nvSpPr>
-          <p:cNvPr id="95" name="Google Shape;95;p18"/>
+          <p:cNvPr id="100" name="Google Shape;100;p18"/>
           <p:cNvSpPr txBox="1"/>
           <p:nvPr>
             <p:ph idx="1" type="body"/>
@@ -8747,7 +9012,7 @@
   <p:cSld>
     <p:spTree>
       <p:nvGrpSpPr>
-        <p:cNvPr id="99" name="Shape 99"/>
+        <p:cNvPr id="104" name="Shape 104"/>
         <p:cNvGrpSpPr/>
         <p:nvPr/>
       </p:nvGrpSpPr>
@@ -8761,7 +9026,7 @@
       </p:grpSpPr>
       <p:sp>
         <p:nvSpPr>
-          <p:cNvPr id="100" name="Google Shape;100;p19"/>
+          <p:cNvPr id="105" name="Google Shape;105;p19"/>
           <p:cNvSpPr txBox="1"/>
           <p:nvPr>
             <p:ph type="title"/>
@@ -8799,248 +9064,1499 @@
           </a:p>
         </p:txBody>
       </p:sp>
-      <p:sp>
-        <p:nvSpPr>
-          <p:cNvPr id="101" name="Google Shape;101;p19"/>
-          <p:cNvSpPr txBox="1"/>
-          <p:nvPr>
-            <p:ph idx="1" type="body"/>
-          </p:nvPr>
-        </p:nvSpPr>
-        <p:spPr>
+      <p:grpSp>
+        <p:nvGrpSpPr>
+          <p:cNvPr id="106" name="Google Shape;106;p19"/>
+          <p:cNvGrpSpPr/>
+          <p:nvPr/>
+        </p:nvGrpSpPr>
+        <p:grpSpPr>
           <a:xfrm>
-            <a:off x="387900" y="1337425"/>
-            <a:ext cx="8368200" cy="3654000"/>
+            <a:off x="2688757" y="1066469"/>
+            <a:ext cx="3768522" cy="3774409"/>
+            <a:chOff x="2675582" y="676586"/>
+            <a:chExt cx="3793942" cy="3790328"/>
           </a:xfrm>
-          <a:prstGeom prst="rect">
-            <a:avLst/>
-          </a:prstGeom>
-        </p:spPr>
-        <p:txBody>
-          <a:bodyPr anchorCtr="0" anchor="t" bIns="91425" lIns="91425" spcFirstLastPara="1" rIns="91425" wrap="square" tIns="91425">
-            <a:normAutofit/>
-          </a:bodyPr>
-          <a:lstStyle/>
-          <a:p>
-            <a:pPr indent="0" lvl="0" marL="0" rtl="0" algn="just">
-              <a:spcBef>
-                <a:spcPts val="0"/>
-              </a:spcBef>
-              <a:spcAft>
-                <a:spcPts val="0"/>
-              </a:spcAft>
-              <a:buClr>
-                <a:schemeClr val="dk1"/>
-              </a:buClr>
-              <a:buSzPts val="1100"/>
-              <a:buFont typeface="Arial"/>
-              <a:buNone/>
-            </a:pPr>
-            <a:r>
-              <a:rPr b="1" lang="en" sz="1600">
+        </p:grpSpPr>
+        <p:sp>
+          <p:nvSpPr>
+            <p:cNvPr id="107" name="Google Shape;107;p19"/>
+            <p:cNvSpPr/>
+            <p:nvPr/>
+          </p:nvSpPr>
+          <p:spPr>
+            <a:xfrm rot="-7199815">
+              <a:off x="3183352" y="1184485"/>
+              <a:ext cx="2774659" cy="2774659"/>
+            </a:xfrm>
+            <a:prstGeom prst="blockArc">
+              <a:avLst>
+                <a:gd fmla="val 12622480" name="adj1"/>
+                <a:gd fmla="val 18176457" name="adj2"/>
+                <a:gd fmla="val 20786" name="adj3"/>
+              </a:avLst>
+            </a:prstGeom>
+            <a:solidFill>
+              <a:srgbClr val="1D7E75"/>
+            </a:solidFill>
+            <a:ln>
+              <a:noFill/>
+            </a:ln>
+          </p:spPr>
+          <p:txBody>
+            <a:bodyPr anchorCtr="0" anchor="ctr" bIns="91425" lIns="91425" spcFirstLastPara="1" rIns="91425" wrap="square" tIns="91425">
+              <a:noAutofit/>
+            </a:bodyPr>
+            <a:lstStyle/>
+            <a:p>
+              <a:pPr indent="0" lvl="0" marL="0" rtl="0" algn="l">
+                <a:spcBef>
+                  <a:spcPts val="0"/>
+                </a:spcBef>
+                <a:spcAft>
+                  <a:spcPts val="0"/>
+                </a:spcAft>
+                <a:buNone/>
+              </a:pPr>
+              <a:r>
+                <a:t/>
+              </a:r>
+              <a:endParaRPr/>
+            </a:p>
+          </p:txBody>
+        </p:sp>
+        <p:sp>
+          <p:nvSpPr>
+            <p:cNvPr id="108" name="Google Shape;108;p19"/>
+            <p:cNvSpPr/>
+            <p:nvPr/>
+          </p:nvSpPr>
+          <p:spPr>
+            <a:xfrm rot="-1799815">
+              <a:off x="3183352" y="1184357"/>
+              <a:ext cx="2774659" cy="2774659"/>
+            </a:xfrm>
+            <a:prstGeom prst="blockArc">
+              <a:avLst>
+                <a:gd fmla="val 12622480" name="adj1"/>
+                <a:gd fmla="val 18176457" name="adj2"/>
+                <a:gd fmla="val 20786" name="adj3"/>
+              </a:avLst>
+            </a:prstGeom>
+            <a:solidFill>
+              <a:srgbClr val="1F887E"/>
+            </a:solidFill>
+            <a:ln>
+              <a:noFill/>
+            </a:ln>
+          </p:spPr>
+          <p:txBody>
+            <a:bodyPr anchorCtr="0" anchor="ctr" bIns="91425" lIns="91425" spcFirstLastPara="1" rIns="91425" wrap="square" tIns="91425">
+              <a:noAutofit/>
+            </a:bodyPr>
+            <a:lstStyle/>
+            <a:p>
+              <a:pPr indent="0" lvl="0" marL="0" rtl="0" algn="l">
+                <a:spcBef>
+                  <a:spcPts val="0"/>
+                </a:spcBef>
+                <a:spcAft>
+                  <a:spcPts val="0"/>
+                </a:spcAft>
+                <a:buNone/>
+              </a:pPr>
+              <a:r>
+                <a:t/>
+              </a:r>
+              <a:endParaRPr/>
+            </a:p>
+          </p:txBody>
+        </p:sp>
+        <p:sp>
+          <p:nvSpPr>
+            <p:cNvPr id="109" name="Google Shape;109;p19"/>
+            <p:cNvSpPr/>
+            <p:nvPr/>
+          </p:nvSpPr>
+          <p:spPr>
+            <a:xfrm rot="3600185">
+              <a:off x="3187094" y="1184439"/>
+              <a:ext cx="2774659" cy="2774659"/>
+            </a:xfrm>
+            <a:prstGeom prst="blockArc">
+              <a:avLst>
+                <a:gd fmla="val 12564381" name="adj1"/>
+                <a:gd fmla="val 18346131" name="adj2"/>
+                <a:gd fmla="val 20844" name="adj3"/>
+              </a:avLst>
+            </a:prstGeom>
+            <a:solidFill>
+              <a:srgbClr val="155B55"/>
+            </a:solidFill>
+            <a:ln>
+              <a:noFill/>
+            </a:ln>
+          </p:spPr>
+          <p:txBody>
+            <a:bodyPr anchorCtr="0" anchor="ctr" bIns="91425" lIns="91425" spcFirstLastPara="1" rIns="91425" wrap="square" tIns="91425">
+              <a:noAutofit/>
+            </a:bodyPr>
+            <a:lstStyle/>
+            <a:p>
+              <a:pPr indent="0" lvl="0" marL="0" rtl="0" algn="l">
+                <a:spcBef>
+                  <a:spcPts val="0"/>
+                </a:spcBef>
+                <a:spcAft>
+                  <a:spcPts val="0"/>
+                </a:spcAft>
+                <a:buNone/>
+              </a:pPr>
+              <a:r>
+                <a:t/>
+              </a:r>
+              <a:endParaRPr/>
+            </a:p>
+          </p:txBody>
+        </p:sp>
+        <p:sp>
+          <p:nvSpPr>
+            <p:cNvPr id="110" name="Google Shape;110;p19"/>
+            <p:cNvSpPr/>
+            <p:nvPr/>
+          </p:nvSpPr>
+          <p:spPr>
+            <a:xfrm rot="9000185">
+              <a:off x="3185977" y="1184485"/>
+              <a:ext cx="2774659" cy="2774659"/>
+            </a:xfrm>
+            <a:prstGeom prst="blockArc">
+              <a:avLst>
+                <a:gd fmla="val 12622480" name="adj1"/>
+                <a:gd fmla="val 18081133" name="adj2"/>
+                <a:gd fmla="val 20809" name="adj3"/>
+              </a:avLst>
+            </a:prstGeom>
+            <a:solidFill>
+              <a:srgbClr val="1B786F"/>
+            </a:solidFill>
+            <a:ln>
+              <a:noFill/>
+            </a:ln>
+          </p:spPr>
+          <p:txBody>
+            <a:bodyPr anchorCtr="0" anchor="ctr" bIns="91425" lIns="91425" spcFirstLastPara="1" rIns="91425" wrap="square" tIns="91425">
+              <a:noAutofit/>
+            </a:bodyPr>
+            <a:lstStyle/>
+            <a:p>
+              <a:pPr indent="0" lvl="0" marL="0" rtl="0" algn="l">
+                <a:spcBef>
+                  <a:spcPts val="0"/>
+                </a:spcBef>
+                <a:spcAft>
+                  <a:spcPts val="0"/>
+                </a:spcAft>
+                <a:buNone/>
+              </a:pPr>
+              <a:r>
+                <a:t/>
+              </a:r>
+              <a:endParaRPr/>
+            </a:p>
+          </p:txBody>
+        </p:sp>
+        <p:grpSp>
+          <p:nvGrpSpPr>
+            <p:cNvPr id="111" name="Google Shape;111;p19"/>
+            <p:cNvGrpSpPr/>
+            <p:nvPr/>
+          </p:nvGrpSpPr>
+          <p:grpSpPr>
+            <a:xfrm rot="5400000">
+              <a:off x="5379663" y="2278951"/>
+              <a:ext cx="585001" cy="585472"/>
+              <a:chOff x="1967628" y="812211"/>
+              <a:chExt cx="588000" cy="588000"/>
+            </a:xfrm>
+          </p:grpSpPr>
+          <p:sp>
+            <p:nvSpPr>
+              <p:cNvPr id="112" name="Google Shape;112;p19"/>
+              <p:cNvSpPr/>
+              <p:nvPr/>
+            </p:nvSpPr>
+            <p:spPr>
+              <a:xfrm rot="39023">
+                <a:off x="1970909" y="815492"/>
+                <a:ext cx="581437" cy="581437"/>
+              </a:xfrm>
+              <a:prstGeom prst="pie">
+                <a:avLst>
+                  <a:gd fmla="val 6190354" name="adj1"/>
+                  <a:gd fmla="val 14996165" name="adj2"/>
+                </a:avLst>
+              </a:prstGeom>
+              <a:solidFill>
+                <a:srgbClr val="1B786F"/>
+              </a:solidFill>
+              <a:ln>
+                <a:noFill/>
+              </a:ln>
+              <a:effectLst>
+                <a:outerShdw blurRad="142875" rotWithShape="0" algn="bl">
+                  <a:srgbClr val="000000">
+                    <a:alpha val="43000"/>
+                  </a:srgbClr>
+                </a:outerShdw>
+              </a:effectLst>
+            </p:spPr>
+            <p:txBody>
+              <a:bodyPr anchorCtr="0" anchor="ctr" bIns="91425" lIns="91425" spcFirstLastPara="1" rIns="91425" wrap="square" tIns="91425">
+                <a:noAutofit/>
+              </a:bodyPr>
+              <a:lstStyle/>
+              <a:p>
+                <a:pPr indent="0" lvl="0" marL="0" rtl="0" algn="l">
+                  <a:spcBef>
+                    <a:spcPts val="0"/>
+                  </a:spcBef>
+                  <a:spcAft>
+                    <a:spcPts val="0"/>
+                  </a:spcAft>
+                  <a:buNone/>
+                </a:pPr>
+                <a:r>
+                  <a:t/>
+                </a:r>
+                <a:endParaRPr/>
+              </a:p>
+            </p:txBody>
+          </p:sp>
+          <p:sp>
+            <p:nvSpPr>
+              <p:cNvPr id="113" name="Google Shape;113;p19"/>
+              <p:cNvSpPr/>
+              <p:nvPr/>
+            </p:nvSpPr>
+            <p:spPr>
+              <a:xfrm rot="10800000">
+                <a:off x="1970875" y="815525"/>
+                <a:ext cx="581400" cy="581400"/>
+              </a:xfrm>
+              <a:prstGeom prst="pie">
+                <a:avLst>
+                  <a:gd fmla="val 4028252" name="adj1"/>
+                  <a:gd fmla="val 17183677" name="adj2"/>
+                </a:avLst>
+              </a:prstGeom>
+              <a:solidFill>
+                <a:srgbClr val="1B786F"/>
+              </a:solidFill>
+              <a:ln>
+                <a:noFill/>
+              </a:ln>
+            </p:spPr>
+            <p:txBody>
+              <a:bodyPr anchorCtr="0" anchor="ctr" bIns="91425" lIns="91425" spcFirstLastPara="1" rIns="91425" wrap="square" tIns="91425">
+                <a:noAutofit/>
+              </a:bodyPr>
+              <a:lstStyle/>
+              <a:p>
+                <a:pPr indent="0" lvl="0" marL="0" rtl="0" algn="l">
+                  <a:spcBef>
+                    <a:spcPts val="0"/>
+                  </a:spcBef>
+                  <a:spcAft>
+                    <a:spcPts val="0"/>
+                  </a:spcAft>
+                  <a:buNone/>
+                </a:pPr>
+                <a:r>
+                  <a:t/>
+                </a:r>
+                <a:endParaRPr/>
+              </a:p>
+            </p:txBody>
+          </p:sp>
+        </p:grpSp>
+        <p:grpSp>
+          <p:nvGrpSpPr>
+            <p:cNvPr id="114" name="Google Shape;114;p19"/>
+            <p:cNvGrpSpPr/>
+            <p:nvPr/>
+          </p:nvGrpSpPr>
+          <p:grpSpPr>
+            <a:xfrm rot="10800000">
+              <a:off x="4280709" y="3378529"/>
+              <a:ext cx="585001" cy="585472"/>
+              <a:chOff x="1967628" y="812211"/>
+              <a:chExt cx="588000" cy="588000"/>
+            </a:xfrm>
+          </p:grpSpPr>
+          <p:sp>
+            <p:nvSpPr>
+              <p:cNvPr id="115" name="Google Shape;115;p19"/>
+              <p:cNvSpPr/>
+              <p:nvPr/>
+            </p:nvSpPr>
+            <p:spPr>
+              <a:xfrm rot="39023">
+                <a:off x="1970909" y="815492"/>
+                <a:ext cx="581437" cy="581437"/>
+              </a:xfrm>
+              <a:prstGeom prst="pie">
+                <a:avLst>
+                  <a:gd fmla="val 6190354" name="adj1"/>
+                  <a:gd fmla="val 14996165" name="adj2"/>
+                </a:avLst>
+              </a:prstGeom>
+              <a:solidFill>
+                <a:srgbClr val="1D7E75"/>
+              </a:solidFill>
+              <a:ln>
+                <a:noFill/>
+              </a:ln>
+              <a:effectLst>
+                <a:outerShdw blurRad="142875" rotWithShape="0" algn="bl">
+                  <a:srgbClr val="000000">
+                    <a:alpha val="43000"/>
+                  </a:srgbClr>
+                </a:outerShdw>
+              </a:effectLst>
+            </p:spPr>
+            <p:txBody>
+              <a:bodyPr anchorCtr="0" anchor="ctr" bIns="91425" lIns="91425" spcFirstLastPara="1" rIns="91425" wrap="square" tIns="91425">
+                <a:noAutofit/>
+              </a:bodyPr>
+              <a:lstStyle/>
+              <a:p>
+                <a:pPr indent="0" lvl="0" marL="0" rtl="0" algn="l">
+                  <a:spcBef>
+                    <a:spcPts val="0"/>
+                  </a:spcBef>
+                  <a:spcAft>
+                    <a:spcPts val="0"/>
+                  </a:spcAft>
+                  <a:buNone/>
+                </a:pPr>
+                <a:r>
+                  <a:t/>
+                </a:r>
+                <a:endParaRPr/>
+              </a:p>
+            </p:txBody>
+          </p:sp>
+          <p:sp>
+            <p:nvSpPr>
+              <p:cNvPr id="116" name="Google Shape;116;p19"/>
+              <p:cNvSpPr/>
+              <p:nvPr/>
+            </p:nvSpPr>
+            <p:spPr>
+              <a:xfrm rot="10800000">
+                <a:off x="1970875" y="815525"/>
+                <a:ext cx="581400" cy="581400"/>
+              </a:xfrm>
+              <a:prstGeom prst="pie">
+                <a:avLst>
+                  <a:gd fmla="val 4028252" name="adj1"/>
+                  <a:gd fmla="val 17183677" name="adj2"/>
+                </a:avLst>
+              </a:prstGeom>
+              <a:solidFill>
+                <a:srgbClr val="1D7E75"/>
+              </a:solidFill>
+              <a:ln>
+                <a:noFill/>
+              </a:ln>
+            </p:spPr>
+            <p:txBody>
+              <a:bodyPr anchorCtr="0" anchor="ctr" bIns="91425" lIns="91425" spcFirstLastPara="1" rIns="91425" wrap="square" tIns="91425">
+                <a:noAutofit/>
+              </a:bodyPr>
+              <a:lstStyle/>
+              <a:p>
+                <a:pPr indent="0" lvl="0" marL="0" rtl="0" algn="l">
+                  <a:spcBef>
+                    <a:spcPts val="0"/>
+                  </a:spcBef>
+                  <a:spcAft>
+                    <a:spcPts val="0"/>
+                  </a:spcAft>
+                  <a:buNone/>
+                </a:pPr>
+                <a:r>
+                  <a:t/>
+                </a:r>
+                <a:endParaRPr/>
+              </a:p>
+            </p:txBody>
+          </p:sp>
+        </p:grpSp>
+        <p:grpSp>
+          <p:nvGrpSpPr>
+            <p:cNvPr id="117" name="Google Shape;117;p19"/>
+            <p:cNvGrpSpPr/>
+            <p:nvPr/>
+          </p:nvGrpSpPr>
+          <p:grpSpPr>
+            <a:xfrm rot="-5400000">
+              <a:off x="3179922" y="2281478"/>
+              <a:ext cx="585001" cy="585472"/>
+              <a:chOff x="1967628" y="812211"/>
+              <a:chExt cx="588000" cy="588000"/>
+            </a:xfrm>
+          </p:grpSpPr>
+          <p:sp>
+            <p:nvSpPr>
+              <p:cNvPr id="118" name="Google Shape;118;p19"/>
+              <p:cNvSpPr/>
+              <p:nvPr/>
+            </p:nvSpPr>
+            <p:spPr>
+              <a:xfrm rot="39023">
+                <a:off x="1970909" y="815492"/>
+                <a:ext cx="581437" cy="581437"/>
+              </a:xfrm>
+              <a:prstGeom prst="pie">
+                <a:avLst>
+                  <a:gd fmla="val 6190354" name="adj1"/>
+                  <a:gd fmla="val 14996165" name="adj2"/>
+                </a:avLst>
+              </a:prstGeom>
+              <a:solidFill>
+                <a:srgbClr val="1F887E"/>
+              </a:solidFill>
+              <a:ln>
+                <a:noFill/>
+              </a:ln>
+              <a:effectLst>
+                <a:outerShdw blurRad="142875" rotWithShape="0" algn="bl">
+                  <a:srgbClr val="000000">
+                    <a:alpha val="43000"/>
+                  </a:srgbClr>
+                </a:outerShdw>
+              </a:effectLst>
+            </p:spPr>
+            <p:txBody>
+              <a:bodyPr anchorCtr="0" anchor="ctr" bIns="91425" lIns="91425" spcFirstLastPara="1" rIns="91425" wrap="square" tIns="91425">
+                <a:noAutofit/>
+              </a:bodyPr>
+              <a:lstStyle/>
+              <a:p>
+                <a:pPr indent="0" lvl="0" marL="0" rtl="0" algn="l">
+                  <a:spcBef>
+                    <a:spcPts val="0"/>
+                  </a:spcBef>
+                  <a:spcAft>
+                    <a:spcPts val="0"/>
+                  </a:spcAft>
+                  <a:buNone/>
+                </a:pPr>
+                <a:r>
+                  <a:t/>
+                </a:r>
+                <a:endParaRPr/>
+              </a:p>
+            </p:txBody>
+          </p:sp>
+          <p:sp>
+            <p:nvSpPr>
+              <p:cNvPr id="119" name="Google Shape;119;p19"/>
+              <p:cNvSpPr/>
+              <p:nvPr/>
+            </p:nvSpPr>
+            <p:spPr>
+              <a:xfrm rot="10800000">
+                <a:off x="1970875" y="815525"/>
+                <a:ext cx="581400" cy="581400"/>
+              </a:xfrm>
+              <a:prstGeom prst="pie">
+                <a:avLst>
+                  <a:gd fmla="val 4028252" name="adj1"/>
+                  <a:gd fmla="val 17183677" name="adj2"/>
+                </a:avLst>
+              </a:prstGeom>
+              <a:solidFill>
+                <a:srgbClr val="1F887E"/>
+              </a:solidFill>
+              <a:ln>
+                <a:noFill/>
+              </a:ln>
+            </p:spPr>
+            <p:txBody>
+              <a:bodyPr anchorCtr="0" anchor="ctr" bIns="91425" lIns="91425" spcFirstLastPara="1" rIns="91425" wrap="square" tIns="91425">
+                <a:noAutofit/>
+              </a:bodyPr>
+              <a:lstStyle/>
+              <a:p>
+                <a:pPr indent="0" lvl="0" marL="0" rtl="0" algn="l">
+                  <a:spcBef>
+                    <a:spcPts val="0"/>
+                  </a:spcBef>
+                  <a:spcAft>
+                    <a:spcPts val="0"/>
+                  </a:spcAft>
+                  <a:buNone/>
+                </a:pPr>
+                <a:r>
+                  <a:t/>
+                </a:r>
+                <a:endParaRPr/>
+              </a:p>
+            </p:txBody>
+          </p:sp>
+        </p:grpSp>
+        <p:sp>
+          <p:nvSpPr>
+            <p:cNvPr id="120" name="Google Shape;120;p19"/>
+            <p:cNvSpPr txBox="1"/>
+            <p:nvPr/>
+          </p:nvSpPr>
+          <p:spPr>
+            <a:xfrm>
+              <a:off x="3214513" y="2360618"/>
+              <a:ext cx="507900" cy="266100"/>
+            </a:xfrm>
+            <a:prstGeom prst="rect">
+              <a:avLst/>
+            </a:prstGeom>
+            <a:noFill/>
+            <a:ln>
+              <a:noFill/>
+            </a:ln>
+          </p:spPr>
+          <p:txBody>
+            <a:bodyPr anchorCtr="0" anchor="t" bIns="91425" lIns="91425" spcFirstLastPara="1" rIns="91425" wrap="square" tIns="91425">
+              <a:noAutofit/>
+            </a:bodyPr>
+            <a:lstStyle/>
+            <a:p>
+              <a:pPr indent="0" lvl="0" marL="0" rtl="0" algn="ctr">
+                <a:spcBef>
+                  <a:spcPts val="0"/>
+                </a:spcBef>
+                <a:spcAft>
+                  <a:spcPts val="0"/>
+                </a:spcAft>
+                <a:buNone/>
+              </a:pPr>
+              <a:r>
+                <a:rPr b="1" lang="en" sz="1600">
+                  <a:solidFill>
+                    <a:srgbClr val="FFFFFF"/>
+                  </a:solidFill>
+                  <a:latin typeface="Roboto"/>
+                  <a:ea typeface="Roboto"/>
+                  <a:cs typeface="Roboto"/>
+                  <a:sym typeface="Roboto"/>
+                </a:rPr>
+                <a:t>01</a:t>
+              </a:r>
+              <a:endParaRPr b="1" sz="1600">
+                <a:solidFill>
+                  <a:srgbClr val="FFFFFF"/>
+                </a:solidFill>
+                <a:latin typeface="Roboto"/>
+                <a:ea typeface="Roboto"/>
+                <a:cs typeface="Roboto"/>
+                <a:sym typeface="Roboto"/>
+              </a:endParaRPr>
+            </a:p>
+          </p:txBody>
+        </p:sp>
+        <p:sp>
+          <p:nvSpPr>
+            <p:cNvPr id="121" name="Google Shape;121;p19"/>
+            <p:cNvSpPr txBox="1"/>
+            <p:nvPr/>
+          </p:nvSpPr>
+          <p:spPr>
+            <a:xfrm>
+              <a:off x="4335750" y="3460301"/>
+              <a:ext cx="507900" cy="266100"/>
+            </a:xfrm>
+            <a:prstGeom prst="rect">
+              <a:avLst/>
+            </a:prstGeom>
+            <a:noFill/>
+            <a:ln>
+              <a:noFill/>
+            </a:ln>
+          </p:spPr>
+          <p:txBody>
+            <a:bodyPr anchorCtr="0" anchor="t" bIns="91425" lIns="91425" spcFirstLastPara="1" rIns="91425" wrap="square" tIns="91425">
+              <a:noAutofit/>
+            </a:bodyPr>
+            <a:lstStyle/>
+            <a:p>
+              <a:pPr indent="0" lvl="0" marL="0" rtl="0" algn="ctr">
+                <a:spcBef>
+                  <a:spcPts val="0"/>
+                </a:spcBef>
+                <a:spcAft>
+                  <a:spcPts val="0"/>
+                </a:spcAft>
+                <a:buNone/>
+              </a:pPr>
+              <a:r>
+                <a:rPr b="1" lang="en" sz="1600">
+                  <a:solidFill>
+                    <a:srgbClr val="FFFFFF"/>
+                  </a:solidFill>
+                  <a:latin typeface="Roboto"/>
+                  <a:ea typeface="Roboto"/>
+                  <a:cs typeface="Roboto"/>
+                  <a:sym typeface="Roboto"/>
+                </a:rPr>
+                <a:t>02</a:t>
+              </a:r>
+              <a:endParaRPr b="1" sz="1600">
+                <a:solidFill>
+                  <a:srgbClr val="FFFFFF"/>
+                </a:solidFill>
+                <a:latin typeface="Roboto"/>
+                <a:ea typeface="Roboto"/>
+                <a:cs typeface="Roboto"/>
+                <a:sym typeface="Roboto"/>
+              </a:endParaRPr>
+            </a:p>
+          </p:txBody>
+        </p:sp>
+        <p:sp>
+          <p:nvSpPr>
+            <p:cNvPr id="122" name="Google Shape;122;p19"/>
+            <p:cNvSpPr txBox="1"/>
+            <p:nvPr/>
+          </p:nvSpPr>
+          <p:spPr>
+            <a:xfrm>
+              <a:off x="5419402" y="2360618"/>
+              <a:ext cx="507900" cy="266100"/>
+            </a:xfrm>
+            <a:prstGeom prst="rect">
+              <a:avLst/>
+            </a:prstGeom>
+            <a:noFill/>
+            <a:ln>
+              <a:noFill/>
+            </a:ln>
+          </p:spPr>
+          <p:txBody>
+            <a:bodyPr anchorCtr="0" anchor="t" bIns="91425" lIns="91425" spcFirstLastPara="1" rIns="91425" wrap="square" tIns="91425">
+              <a:noAutofit/>
+            </a:bodyPr>
+            <a:lstStyle/>
+            <a:p>
+              <a:pPr indent="0" lvl="0" marL="0" rtl="0" algn="ctr">
+                <a:spcBef>
+                  <a:spcPts val="0"/>
+                </a:spcBef>
+                <a:spcAft>
+                  <a:spcPts val="0"/>
+                </a:spcAft>
+                <a:buNone/>
+              </a:pPr>
+              <a:r>
+                <a:rPr b="1" lang="en" sz="1600">
+                  <a:solidFill>
+                    <a:srgbClr val="FFFFFF"/>
+                  </a:solidFill>
+                  <a:latin typeface="Roboto"/>
+                  <a:ea typeface="Roboto"/>
+                  <a:cs typeface="Roboto"/>
+                  <a:sym typeface="Roboto"/>
+                </a:rPr>
+                <a:t>03</a:t>
+              </a:r>
+              <a:endParaRPr b="1" sz="1600">
+                <a:solidFill>
+                  <a:srgbClr val="FFFFFF"/>
+                </a:solidFill>
+                <a:latin typeface="Roboto"/>
+                <a:ea typeface="Roboto"/>
+                <a:cs typeface="Roboto"/>
+                <a:sym typeface="Roboto"/>
+              </a:endParaRPr>
+            </a:p>
+          </p:txBody>
+        </p:sp>
+        <p:grpSp>
+          <p:nvGrpSpPr>
+            <p:cNvPr id="123" name="Google Shape;123;p19"/>
+            <p:cNvGrpSpPr/>
+            <p:nvPr/>
+          </p:nvGrpSpPr>
+          <p:grpSpPr>
+            <a:xfrm>
+              <a:off x="4261689" y="1180926"/>
+              <a:ext cx="585001" cy="585530"/>
+              <a:chOff x="1967628" y="812211"/>
+              <a:chExt cx="588000" cy="588000"/>
+            </a:xfrm>
+          </p:grpSpPr>
+          <p:sp>
+            <p:nvSpPr>
+              <p:cNvPr id="124" name="Google Shape;124;p19"/>
+              <p:cNvSpPr/>
+              <p:nvPr/>
+            </p:nvSpPr>
+            <p:spPr>
+              <a:xfrm rot="39023">
+                <a:off x="1970909" y="815492"/>
+                <a:ext cx="581437" cy="581437"/>
+              </a:xfrm>
+              <a:prstGeom prst="pie">
+                <a:avLst>
+                  <a:gd fmla="val 6190354" name="adj1"/>
+                  <a:gd fmla="val 14996165" name="adj2"/>
+                </a:avLst>
+              </a:prstGeom>
+              <a:solidFill>
+                <a:srgbClr val="155B55"/>
+              </a:solidFill>
+              <a:ln>
+                <a:noFill/>
+              </a:ln>
+              <a:effectLst>
+                <a:outerShdw blurRad="142875" rotWithShape="0" algn="bl">
+                  <a:srgbClr val="000000">
+                    <a:alpha val="43000"/>
+                  </a:srgbClr>
+                </a:outerShdw>
+              </a:effectLst>
+            </p:spPr>
+            <p:txBody>
+              <a:bodyPr anchorCtr="0" anchor="ctr" bIns="91425" lIns="91425" spcFirstLastPara="1" rIns="91425" wrap="square" tIns="91425">
+                <a:noAutofit/>
+              </a:bodyPr>
+              <a:lstStyle/>
+              <a:p>
+                <a:pPr indent="0" lvl="0" marL="0" rtl="0" algn="l">
+                  <a:spcBef>
+                    <a:spcPts val="0"/>
+                  </a:spcBef>
+                  <a:spcAft>
+                    <a:spcPts val="0"/>
+                  </a:spcAft>
+                  <a:buNone/>
+                </a:pPr>
+                <a:r>
+                  <a:t/>
+                </a:r>
+                <a:endParaRPr/>
+              </a:p>
+            </p:txBody>
+          </p:sp>
+          <p:sp>
+            <p:nvSpPr>
+              <p:cNvPr id="125" name="Google Shape;125;p19"/>
+              <p:cNvSpPr/>
+              <p:nvPr/>
+            </p:nvSpPr>
+            <p:spPr>
+              <a:xfrm rot="10800000">
+                <a:off x="1970875" y="815525"/>
+                <a:ext cx="581400" cy="581400"/>
+              </a:xfrm>
+              <a:prstGeom prst="pie">
+                <a:avLst>
+                  <a:gd fmla="val 4028252" name="adj1"/>
+                  <a:gd fmla="val 17183677" name="adj2"/>
+                </a:avLst>
+              </a:prstGeom>
+              <a:solidFill>
+                <a:srgbClr val="155B55"/>
+              </a:solidFill>
+              <a:ln>
+                <a:noFill/>
+              </a:ln>
+            </p:spPr>
+            <p:txBody>
+              <a:bodyPr anchorCtr="0" anchor="ctr" bIns="91425" lIns="91425" spcFirstLastPara="1" rIns="91425" wrap="square" tIns="91425">
+                <a:noAutofit/>
+              </a:bodyPr>
+              <a:lstStyle/>
+              <a:p>
+                <a:pPr indent="0" lvl="0" marL="0" rtl="0" algn="l">
+                  <a:spcBef>
+                    <a:spcPts val="0"/>
+                  </a:spcBef>
+                  <a:spcAft>
+                    <a:spcPts val="0"/>
+                  </a:spcAft>
+                  <a:buNone/>
+                </a:pPr>
+                <a:r>
+                  <a:t/>
+                </a:r>
+                <a:endParaRPr/>
+              </a:p>
+            </p:txBody>
+          </p:sp>
+        </p:grpSp>
+        <p:sp>
+          <p:nvSpPr>
+            <p:cNvPr id="126" name="Google Shape;126;p19"/>
+            <p:cNvSpPr txBox="1"/>
+            <p:nvPr/>
+          </p:nvSpPr>
+          <p:spPr>
+            <a:xfrm>
+              <a:off x="4335750" y="1254446"/>
+              <a:ext cx="507900" cy="266100"/>
+            </a:xfrm>
+            <a:prstGeom prst="rect">
+              <a:avLst/>
+            </a:prstGeom>
+            <a:noFill/>
+            <a:ln>
+              <a:noFill/>
+            </a:ln>
+          </p:spPr>
+          <p:txBody>
+            <a:bodyPr anchorCtr="0" anchor="t" bIns="91425" lIns="91425" spcFirstLastPara="1" rIns="91425" wrap="square" tIns="91425">
+              <a:noAutofit/>
+            </a:bodyPr>
+            <a:lstStyle/>
+            <a:p>
+              <a:pPr indent="0" lvl="0" marL="0" rtl="0" algn="ctr">
+                <a:spcBef>
+                  <a:spcPts val="0"/>
+                </a:spcBef>
+                <a:spcAft>
+                  <a:spcPts val="0"/>
+                </a:spcAft>
+                <a:buNone/>
+              </a:pPr>
+              <a:r>
+                <a:rPr b="1" lang="en" sz="1600">
+                  <a:solidFill>
+                    <a:srgbClr val="FFFFFF"/>
+                  </a:solidFill>
+                  <a:latin typeface="Roboto"/>
+                  <a:ea typeface="Roboto"/>
+                  <a:cs typeface="Roboto"/>
+                  <a:sym typeface="Roboto"/>
+                </a:rPr>
+                <a:t>04</a:t>
+              </a:r>
+              <a:endParaRPr b="1" sz="1600">
+                <a:solidFill>
+                  <a:srgbClr val="FFFFFF"/>
+                </a:solidFill>
+                <a:latin typeface="Roboto"/>
+                <a:ea typeface="Roboto"/>
+                <a:cs typeface="Roboto"/>
+                <a:sym typeface="Roboto"/>
+              </a:endParaRPr>
+            </a:p>
+          </p:txBody>
+        </p:sp>
+      </p:grpSp>
+      <p:grpSp>
+        <p:nvGrpSpPr>
+          <p:cNvPr id="127" name="Google Shape;127;p19"/>
+          <p:cNvGrpSpPr/>
+          <p:nvPr/>
+        </p:nvGrpSpPr>
+        <p:grpSpPr>
+          <a:xfrm>
+            <a:off x="323513" y="1504925"/>
+            <a:ext cx="3362713" cy="1289700"/>
+            <a:chOff x="323500" y="1170475"/>
+            <a:chExt cx="3362713" cy="1289700"/>
+          </a:xfrm>
+        </p:grpSpPr>
+        <p:sp>
+          <p:nvSpPr>
+            <p:cNvPr id="128" name="Google Shape;128;p19"/>
+            <p:cNvSpPr txBox="1"/>
+            <p:nvPr/>
+          </p:nvSpPr>
+          <p:spPr>
+            <a:xfrm>
+              <a:off x="323500" y="1170475"/>
+              <a:ext cx="2124000" cy="1289700"/>
+            </a:xfrm>
+            <a:prstGeom prst="rect">
+              <a:avLst/>
+            </a:prstGeom>
+            <a:noFill/>
+            <a:ln>
+              <a:noFill/>
+            </a:ln>
+          </p:spPr>
+          <p:txBody>
+            <a:bodyPr anchorCtr="0" anchor="ctr" bIns="91425" lIns="91425" spcFirstLastPara="1" rIns="91425" wrap="square" tIns="91425">
+              <a:noAutofit/>
+            </a:bodyPr>
+            <a:lstStyle/>
+            <a:p>
+              <a:pPr indent="0" lvl="0" marL="0" rtl="0" algn="l">
+                <a:spcBef>
+                  <a:spcPts val="0"/>
+                </a:spcBef>
+                <a:spcAft>
+                  <a:spcPts val="0"/>
+                </a:spcAft>
+                <a:buNone/>
+              </a:pPr>
+              <a:r>
+                <a:rPr b="1" lang="en">
+                  <a:solidFill>
+                    <a:schemeClr val="dk1"/>
+                  </a:solidFill>
+                  <a:latin typeface="Roboto"/>
+                  <a:ea typeface="Roboto"/>
+                  <a:cs typeface="Roboto"/>
+                  <a:sym typeface="Roboto"/>
+                </a:rPr>
+                <a:t>File Reading</a:t>
+              </a:r>
+              <a:endParaRPr b="1">
                 <a:solidFill>
                   <a:schemeClr val="dk1"/>
                 </a:solidFill>
-              </a:rPr>
-              <a:t>Index Creation</a:t>
-            </a:r>
-            <a:r>
-              <a:rPr lang="en" sz="1600">
+                <a:latin typeface="Roboto"/>
+                <a:ea typeface="Roboto"/>
+                <a:cs typeface="Roboto"/>
+                <a:sym typeface="Roboto"/>
+              </a:endParaRPr>
+            </a:p>
+            <a:p>
+              <a:pPr indent="0" lvl="0" marL="0" rtl="0" algn="just">
+                <a:lnSpc>
+                  <a:spcPct val="115000"/>
+                </a:lnSpc>
+                <a:spcBef>
+                  <a:spcPts val="1600"/>
+                </a:spcBef>
+                <a:spcAft>
+                  <a:spcPts val="0"/>
+                </a:spcAft>
+                <a:buNone/>
+              </a:pPr>
+              <a:r>
+                <a:rPr lang="en" sz="1200">
+                  <a:solidFill>
+                    <a:srgbClr val="FFFFFF"/>
+                  </a:solidFill>
+                  <a:latin typeface="Roboto"/>
+                  <a:ea typeface="Roboto"/>
+                  <a:cs typeface="Roboto"/>
+                  <a:sym typeface="Roboto"/>
+                </a:rPr>
+                <a:t>Iterates over all text files in a folder and reads the content.</a:t>
+              </a:r>
+              <a:endParaRPr b="1">
                 <a:solidFill>
                   <a:schemeClr val="dk1"/>
                 </a:solidFill>
-              </a:rPr>
-              <a:t>:</a:t>
-            </a:r>
-            <a:endParaRPr sz="1600">
+                <a:latin typeface="Roboto"/>
+                <a:ea typeface="Roboto"/>
+                <a:cs typeface="Roboto"/>
+                <a:sym typeface="Roboto"/>
+              </a:endParaRPr>
+            </a:p>
+          </p:txBody>
+        </p:sp>
+        <p:cxnSp>
+          <p:nvCxnSpPr>
+            <p:cNvPr id="129" name="Google Shape;129;p19"/>
+            <p:cNvCxnSpPr/>
+            <p:nvPr/>
+          </p:nvCxnSpPr>
+          <p:spPr>
+            <a:xfrm rot="10800000">
+              <a:off x="2641913" y="1831625"/>
+              <a:ext cx="1044300" cy="0"/>
+            </a:xfrm>
+            <a:prstGeom prst="straightConnector1">
+              <a:avLst/>
+            </a:prstGeom>
+            <a:noFill/>
+            <a:ln cap="flat" cmpd="sng" w="9525">
               <a:solidFill>
-                <a:schemeClr val="dk1"/>
+                <a:srgbClr val="1F887E"/>
               </a:solidFill>
-            </a:endParaRPr>
-          </a:p>
-          <a:p>
-            <a:pPr indent="-330200" lvl="1" marL="914400" rtl="0" algn="just">
-              <a:spcBef>
-                <a:spcPts val="1200"/>
-              </a:spcBef>
-              <a:spcAft>
-                <a:spcPts val="0"/>
-              </a:spcAft>
-              <a:buClr>
-                <a:schemeClr val="dk1"/>
-              </a:buClr>
-              <a:buSzPts val="1600"/>
-              <a:buChar char="○"/>
-            </a:pPr>
-            <a:r>
-              <a:rPr lang="en" sz="1600"/>
-              <a:t>The program iterates over all text files in a folder and reads the content.</a:t>
-            </a:r>
-            <a:endParaRPr sz="1600"/>
-          </a:p>
-          <a:p>
-            <a:pPr indent="-330200" lvl="1" marL="914400" rtl="0" algn="just">
-              <a:spcBef>
-                <a:spcPts val="0"/>
-              </a:spcBef>
-              <a:spcAft>
-                <a:spcPts val="0"/>
-              </a:spcAft>
-              <a:buClr>
-                <a:schemeClr val="dk1"/>
-              </a:buClr>
-              <a:buSzPts val="1600"/>
-              <a:buChar char="○"/>
-            </a:pPr>
-            <a:r>
-              <a:rPr lang="en" sz="1600"/>
-              <a:t>Each word is checked against the list of stop words and verb suffixes.</a:t>
-            </a:r>
-            <a:endParaRPr sz="1600"/>
-          </a:p>
-          <a:p>
-            <a:pPr indent="-330200" lvl="1" marL="914400" rtl="0" algn="just">
-              <a:spcBef>
-                <a:spcPts val="0"/>
-              </a:spcBef>
-              <a:spcAft>
-                <a:spcPts val="0"/>
-              </a:spcAft>
-              <a:buClr>
-                <a:schemeClr val="dk1"/>
-              </a:buClr>
-              <a:buSzPts val="1600"/>
-              <a:buChar char="○"/>
-            </a:pPr>
-            <a:r>
-              <a:rPr lang="en" sz="1600"/>
-              <a:t>Only relevant nouns are indexed, with each word mapped to a list of files it appears in.</a:t>
-            </a:r>
-            <a:endParaRPr sz="1600"/>
-          </a:p>
-          <a:p>
-            <a:pPr indent="0" lvl="0" marL="0" rtl="0" algn="just">
-              <a:spcBef>
-                <a:spcPts val="1200"/>
-              </a:spcBef>
-              <a:spcAft>
-                <a:spcPts val="0"/>
-              </a:spcAft>
-              <a:buClr>
-                <a:schemeClr val="dk1"/>
-              </a:buClr>
-              <a:buSzPts val="1100"/>
-              <a:buFont typeface="Arial"/>
-              <a:buNone/>
-            </a:pPr>
-            <a:r>
-              <a:rPr b="1" lang="en" sz="1600">
+              <a:prstDash val="solid"/>
+              <a:round/>
+              <a:headEnd len="sm" w="sm" type="none"/>
+              <a:tailEnd len="med" w="med" type="oval"/>
+            </a:ln>
+          </p:spPr>
+        </p:cxnSp>
+      </p:grpSp>
+      <p:grpSp>
+        <p:nvGrpSpPr>
+          <p:cNvPr id="130" name="Google Shape;130;p19"/>
+          <p:cNvGrpSpPr/>
+          <p:nvPr/>
+        </p:nvGrpSpPr>
+        <p:grpSpPr>
+          <a:xfrm>
+            <a:off x="323513" y="3162725"/>
+            <a:ext cx="3629413" cy="1289700"/>
+            <a:chOff x="323500" y="2828275"/>
+            <a:chExt cx="3629413" cy="1289700"/>
+          </a:xfrm>
+        </p:grpSpPr>
+        <p:sp>
+          <p:nvSpPr>
+            <p:cNvPr id="131" name="Google Shape;131;p19"/>
+            <p:cNvSpPr txBox="1"/>
+            <p:nvPr/>
+          </p:nvSpPr>
+          <p:spPr>
+            <a:xfrm>
+              <a:off x="323500" y="2828275"/>
+              <a:ext cx="2124000" cy="1289700"/>
+            </a:xfrm>
+            <a:prstGeom prst="rect">
+              <a:avLst/>
+            </a:prstGeom>
+            <a:noFill/>
+            <a:ln>
+              <a:noFill/>
+            </a:ln>
+          </p:spPr>
+          <p:txBody>
+            <a:bodyPr anchorCtr="0" anchor="ctr" bIns="91425" lIns="91425" spcFirstLastPara="1" rIns="91425" wrap="square" tIns="91425">
+              <a:noAutofit/>
+            </a:bodyPr>
+            <a:lstStyle/>
+            <a:p>
+              <a:pPr indent="0" lvl="0" marL="0" rtl="0" algn="l">
+                <a:spcBef>
+                  <a:spcPts val="0"/>
+                </a:spcBef>
+                <a:spcAft>
+                  <a:spcPts val="0"/>
+                </a:spcAft>
+                <a:buNone/>
+              </a:pPr>
+              <a:r>
+                <a:rPr b="1" lang="en">
+                  <a:solidFill>
+                    <a:schemeClr val="dk1"/>
+                  </a:solidFill>
+                  <a:latin typeface="Roboto"/>
+                  <a:ea typeface="Roboto"/>
+                  <a:cs typeface="Roboto"/>
+                  <a:sym typeface="Roboto"/>
+                </a:rPr>
+                <a:t>Words Filtering</a:t>
+              </a:r>
+              <a:endParaRPr b="1">
                 <a:solidFill>
                   <a:schemeClr val="dk1"/>
                 </a:solidFill>
-              </a:rPr>
-              <a:t>Search Functionality</a:t>
-            </a:r>
-            <a:r>
-              <a:rPr lang="en" sz="1600">
+                <a:latin typeface="Roboto"/>
+                <a:ea typeface="Roboto"/>
+                <a:cs typeface="Roboto"/>
+                <a:sym typeface="Roboto"/>
+              </a:endParaRPr>
+            </a:p>
+            <a:p>
+              <a:pPr indent="0" lvl="0" marL="12700" rtl="0" algn="just">
+                <a:lnSpc>
+                  <a:spcPct val="115000"/>
+                </a:lnSpc>
+                <a:spcBef>
+                  <a:spcPts val="0"/>
+                </a:spcBef>
+                <a:spcAft>
+                  <a:spcPts val="0"/>
+                </a:spcAft>
+                <a:buNone/>
+              </a:pPr>
+              <a:r>
+                <a:t/>
+              </a:r>
+              <a:endParaRPr sz="1200">
+                <a:solidFill>
+                  <a:srgbClr val="FFFFFF"/>
+                </a:solidFill>
+                <a:latin typeface="Roboto"/>
+                <a:ea typeface="Roboto"/>
+                <a:cs typeface="Roboto"/>
+                <a:sym typeface="Roboto"/>
+              </a:endParaRPr>
+            </a:p>
+            <a:p>
+              <a:pPr indent="0" lvl="0" marL="12700" rtl="0" algn="l">
+                <a:lnSpc>
+                  <a:spcPct val="115000"/>
+                </a:lnSpc>
+                <a:spcBef>
+                  <a:spcPts val="0"/>
+                </a:spcBef>
+                <a:spcAft>
+                  <a:spcPts val="0"/>
+                </a:spcAft>
+                <a:buNone/>
+              </a:pPr>
+              <a:r>
+                <a:rPr lang="en" sz="1200">
+                  <a:solidFill>
+                    <a:srgbClr val="FFFFFF"/>
+                  </a:solidFill>
+                  <a:latin typeface="Roboto"/>
+                  <a:ea typeface="Roboto"/>
+                  <a:cs typeface="Roboto"/>
+                  <a:sym typeface="Roboto"/>
+                </a:rPr>
+                <a:t>Words are filtered against list of stop words and verb suffixes.</a:t>
+              </a:r>
+              <a:endParaRPr sz="1200">
                 <a:solidFill>
                   <a:schemeClr val="dk1"/>
                 </a:solidFill>
-              </a:rPr>
-              <a:t>:</a:t>
-            </a:r>
-            <a:endParaRPr sz="1600">
+                <a:latin typeface="Roboto"/>
+                <a:ea typeface="Roboto"/>
+                <a:cs typeface="Roboto"/>
+                <a:sym typeface="Roboto"/>
+              </a:endParaRPr>
+            </a:p>
+          </p:txBody>
+        </p:sp>
+        <p:cxnSp>
+          <p:nvCxnSpPr>
+            <p:cNvPr id="132" name="Google Shape;132;p19"/>
+            <p:cNvCxnSpPr/>
+            <p:nvPr/>
+          </p:nvCxnSpPr>
+          <p:spPr>
+            <a:xfrm rot="10800000">
+              <a:off x="2641913" y="3489425"/>
+              <a:ext cx="1311000" cy="0"/>
+            </a:xfrm>
+            <a:prstGeom prst="straightConnector1">
+              <a:avLst/>
+            </a:prstGeom>
+            <a:noFill/>
+            <a:ln cap="flat" cmpd="sng" w="9525">
               <a:solidFill>
-                <a:schemeClr val="dk1"/>
+                <a:srgbClr val="1D7E75"/>
               </a:solidFill>
-            </a:endParaRPr>
-          </a:p>
-          <a:p>
-            <a:pPr indent="-330200" lvl="1" marL="914400" rtl="0" algn="just">
-              <a:spcBef>
-                <a:spcPts val="1200"/>
-              </a:spcBef>
-              <a:spcAft>
-                <a:spcPts val="0"/>
-              </a:spcAft>
-              <a:buClr>
-                <a:schemeClr val="dk1"/>
-              </a:buClr>
-              <a:buSzPts val="1600"/>
-              <a:buChar char="○"/>
-            </a:pPr>
-            <a:r>
-              <a:rPr lang="en" sz="1600">
+              <a:prstDash val="solid"/>
+              <a:round/>
+              <a:headEnd len="sm" w="sm" type="none"/>
+              <a:tailEnd len="med" w="med" type="oval"/>
+            </a:ln>
+          </p:spPr>
+        </p:cxnSp>
+      </p:grpSp>
+      <p:grpSp>
+        <p:nvGrpSpPr>
+          <p:cNvPr id="133" name="Google Shape;133;p19"/>
+          <p:cNvGrpSpPr/>
+          <p:nvPr/>
+        </p:nvGrpSpPr>
+        <p:grpSpPr>
+          <a:xfrm>
+            <a:off x="5209838" y="1394800"/>
+            <a:ext cx="3610650" cy="1289700"/>
+            <a:chOff x="5209825" y="1060350"/>
+            <a:chExt cx="3610650" cy="1289700"/>
+          </a:xfrm>
+        </p:grpSpPr>
+        <p:sp>
+          <p:nvSpPr>
+            <p:cNvPr id="134" name="Google Shape;134;p19"/>
+            <p:cNvSpPr txBox="1"/>
+            <p:nvPr/>
+          </p:nvSpPr>
+          <p:spPr>
+            <a:xfrm>
+              <a:off x="6696475" y="1060350"/>
+              <a:ext cx="2124000" cy="1289700"/>
+            </a:xfrm>
+            <a:prstGeom prst="rect">
+              <a:avLst/>
+            </a:prstGeom>
+            <a:noFill/>
+            <a:ln>
+              <a:noFill/>
+            </a:ln>
+          </p:spPr>
+          <p:txBody>
+            <a:bodyPr anchorCtr="0" anchor="ctr" bIns="91425" lIns="91425" spcFirstLastPara="1" rIns="91425" wrap="square" tIns="91425">
+              <a:noAutofit/>
+            </a:bodyPr>
+            <a:lstStyle/>
+            <a:p>
+              <a:pPr indent="0" lvl="0" marL="0" rtl="0" algn="l">
+                <a:spcBef>
+                  <a:spcPts val="0"/>
+                </a:spcBef>
+                <a:spcAft>
+                  <a:spcPts val="0"/>
+                </a:spcAft>
+                <a:buNone/>
+              </a:pPr>
+              <a:r>
+                <a:rPr b="1" lang="en">
+                  <a:solidFill>
+                    <a:schemeClr val="dk1"/>
+                  </a:solidFill>
+                  <a:latin typeface="Roboto"/>
+                  <a:ea typeface="Roboto"/>
+                  <a:cs typeface="Roboto"/>
+                  <a:sym typeface="Roboto"/>
+                </a:rPr>
+                <a:t>Search Functionality</a:t>
+              </a:r>
+              <a:endParaRPr b="1">
                 <a:solidFill>
                   <a:schemeClr val="dk1"/>
                 </a:solidFill>
-              </a:rPr>
-              <a:t>When a search is conducted, the query is split, normalized, and compared against the dictionary.</a:t>
-            </a:r>
-            <a:endParaRPr sz="1600">
-              <a:solidFill>
-                <a:schemeClr val="dk1"/>
-              </a:solidFill>
-            </a:endParaRPr>
-          </a:p>
-          <a:p>
-            <a:pPr indent="-330200" lvl="1" marL="914400" rtl="0" algn="just">
-              <a:spcBef>
-                <a:spcPts val="0"/>
-              </a:spcBef>
-              <a:spcAft>
-                <a:spcPts val="0"/>
-              </a:spcAft>
-              <a:buClr>
-                <a:schemeClr val="dk1"/>
-              </a:buClr>
-              <a:buSzPts val="1600"/>
-              <a:buChar char="○"/>
-            </a:pPr>
-            <a:r>
-              <a:rPr lang="en" sz="1600">
+                <a:latin typeface="Roboto"/>
+                <a:ea typeface="Roboto"/>
+                <a:cs typeface="Roboto"/>
+                <a:sym typeface="Roboto"/>
+              </a:endParaRPr>
+            </a:p>
+            <a:p>
+              <a:pPr indent="0" lvl="0" marL="0" rtl="0" algn="l">
+                <a:spcBef>
+                  <a:spcPts val="0"/>
+                </a:spcBef>
+                <a:spcAft>
+                  <a:spcPts val="0"/>
+                </a:spcAft>
+                <a:buNone/>
+              </a:pPr>
+              <a:r>
+                <a:t/>
+              </a:r>
+              <a:endParaRPr b="1" sz="800">
                 <a:solidFill>
                   <a:schemeClr val="dk1"/>
                 </a:solidFill>
-              </a:rPr>
-              <a:t>Matched keywords return a list of documents containing the terms.</a:t>
-            </a:r>
-            <a:endParaRPr sz="1600">
-              <a:solidFill>
-                <a:schemeClr val="dk1"/>
-              </a:solidFill>
-            </a:endParaRPr>
-          </a:p>
-          <a:p>
-            <a:pPr indent="-330200" lvl="1" marL="914400" rtl="0" algn="just">
-              <a:spcBef>
-                <a:spcPts val="0"/>
-              </a:spcBef>
-              <a:spcAft>
-                <a:spcPts val="0"/>
-              </a:spcAft>
-              <a:buClr>
-                <a:schemeClr val="dk1"/>
-              </a:buClr>
-              <a:buSzPts val="1600"/>
-              <a:buChar char="○"/>
-            </a:pPr>
-            <a:r>
-              <a:rPr lang="en" sz="1600">
+                <a:latin typeface="Roboto"/>
+                <a:ea typeface="Roboto"/>
+                <a:cs typeface="Roboto"/>
+                <a:sym typeface="Roboto"/>
+              </a:endParaRPr>
+            </a:p>
+            <a:p>
+              <a:pPr indent="0" lvl="0" marL="0" rtl="0" algn="l">
+                <a:spcBef>
+                  <a:spcPts val="0"/>
+                </a:spcBef>
+                <a:spcAft>
+                  <a:spcPts val="1600"/>
+                </a:spcAft>
+                <a:buNone/>
+              </a:pPr>
+              <a:r>
+                <a:rPr lang="en" sz="1200">
+                  <a:solidFill>
+                    <a:schemeClr val="dk1"/>
+                  </a:solidFill>
+                  <a:latin typeface="Roboto"/>
+                  <a:ea typeface="Roboto"/>
+                  <a:cs typeface="Roboto"/>
+                  <a:sym typeface="Roboto"/>
+                </a:rPr>
+                <a:t>Query is split and normalized, then compared in dictionary to display the relevant documents</a:t>
+              </a:r>
+              <a:endParaRPr b="1" sz="1200">
                 <a:solidFill>
                   <a:schemeClr val="dk1"/>
                 </a:solidFill>
-              </a:rPr>
-              <a:t>Results are then displayed.</a:t>
-            </a:r>
-            <a:endParaRPr b="1" sz="1600">
+                <a:latin typeface="Roboto"/>
+                <a:ea typeface="Roboto"/>
+                <a:cs typeface="Roboto"/>
+                <a:sym typeface="Roboto"/>
+              </a:endParaRPr>
+            </a:p>
+          </p:txBody>
+        </p:sp>
+        <p:cxnSp>
+          <p:nvCxnSpPr>
+            <p:cNvPr id="135" name="Google Shape;135;p19"/>
+            <p:cNvCxnSpPr/>
+            <p:nvPr/>
+          </p:nvCxnSpPr>
+          <p:spPr>
+            <a:xfrm>
+              <a:off x="5209825" y="1705200"/>
+              <a:ext cx="1286700" cy="0"/>
+            </a:xfrm>
+            <a:prstGeom prst="straightConnector1">
+              <a:avLst/>
+            </a:prstGeom>
+            <a:noFill/>
+            <a:ln cap="flat" cmpd="sng" w="9525">
               <a:solidFill>
-                <a:schemeClr val="dk1"/>
+                <a:srgbClr val="155B55"/>
               </a:solidFill>
-            </a:endParaRPr>
-          </a:p>
-        </p:txBody>
-      </p:sp>
+              <a:prstDash val="solid"/>
+              <a:round/>
+              <a:headEnd len="sm" w="sm" type="none"/>
+              <a:tailEnd len="med" w="med" type="oval"/>
+            </a:ln>
+          </p:spPr>
+        </p:cxnSp>
+      </p:grpSp>
+      <p:grpSp>
+        <p:nvGrpSpPr>
+          <p:cNvPr id="136" name="Google Shape;136;p19"/>
+          <p:cNvGrpSpPr/>
+          <p:nvPr/>
+        </p:nvGrpSpPr>
+        <p:grpSpPr>
+          <a:xfrm>
+            <a:off x="5209838" y="3354900"/>
+            <a:ext cx="3610650" cy="1289700"/>
+            <a:chOff x="5209825" y="3020450"/>
+            <a:chExt cx="3610650" cy="1289700"/>
+          </a:xfrm>
+        </p:grpSpPr>
+        <p:sp>
+          <p:nvSpPr>
+            <p:cNvPr id="137" name="Google Shape;137;p19"/>
+            <p:cNvSpPr txBox="1"/>
+            <p:nvPr/>
+          </p:nvSpPr>
+          <p:spPr>
+            <a:xfrm>
+              <a:off x="6696475" y="3020450"/>
+              <a:ext cx="2124000" cy="1289700"/>
+            </a:xfrm>
+            <a:prstGeom prst="rect">
+              <a:avLst/>
+            </a:prstGeom>
+            <a:noFill/>
+            <a:ln>
+              <a:noFill/>
+            </a:ln>
+          </p:spPr>
+          <p:txBody>
+            <a:bodyPr anchorCtr="0" anchor="ctr" bIns="91425" lIns="91425" spcFirstLastPara="1" rIns="91425" wrap="square" tIns="91425">
+              <a:noAutofit/>
+            </a:bodyPr>
+            <a:lstStyle/>
+            <a:p>
+              <a:pPr indent="0" lvl="0" marL="0" rtl="0" algn="l">
+                <a:spcBef>
+                  <a:spcPts val="0"/>
+                </a:spcBef>
+                <a:spcAft>
+                  <a:spcPts val="0"/>
+                </a:spcAft>
+                <a:buNone/>
+              </a:pPr>
+              <a:r>
+                <a:rPr b="1" lang="en">
+                  <a:solidFill>
+                    <a:schemeClr val="dk1"/>
+                  </a:solidFill>
+                  <a:latin typeface="Roboto"/>
+                  <a:ea typeface="Roboto"/>
+                  <a:cs typeface="Roboto"/>
+                  <a:sym typeface="Roboto"/>
+                </a:rPr>
+                <a:t>Creation of Indexes</a:t>
+              </a:r>
+              <a:endParaRPr b="1">
+                <a:solidFill>
+                  <a:schemeClr val="dk1"/>
+                </a:solidFill>
+                <a:latin typeface="Roboto"/>
+                <a:ea typeface="Roboto"/>
+                <a:cs typeface="Roboto"/>
+                <a:sym typeface="Roboto"/>
+              </a:endParaRPr>
+            </a:p>
+            <a:p>
+              <a:pPr indent="0" lvl="0" marL="0" rtl="0" algn="l">
+                <a:spcBef>
+                  <a:spcPts val="0"/>
+                </a:spcBef>
+                <a:spcAft>
+                  <a:spcPts val="0"/>
+                </a:spcAft>
+                <a:buNone/>
+              </a:pPr>
+              <a:r>
+                <a:t/>
+              </a:r>
+              <a:endParaRPr b="1" sz="800">
+                <a:solidFill>
+                  <a:schemeClr val="dk1"/>
+                </a:solidFill>
+                <a:latin typeface="Roboto"/>
+                <a:ea typeface="Roboto"/>
+                <a:cs typeface="Roboto"/>
+                <a:sym typeface="Roboto"/>
+              </a:endParaRPr>
+            </a:p>
+            <a:p>
+              <a:pPr indent="0" lvl="0" marL="0" rtl="0" algn="l">
+                <a:spcBef>
+                  <a:spcPts val="0"/>
+                </a:spcBef>
+                <a:spcAft>
+                  <a:spcPts val="1600"/>
+                </a:spcAft>
+                <a:buNone/>
+              </a:pPr>
+              <a:r>
+                <a:rPr lang="en" sz="1200">
+                  <a:solidFill>
+                    <a:schemeClr val="dk1"/>
+                  </a:solidFill>
+                  <a:latin typeface="Roboto"/>
+                  <a:ea typeface="Roboto"/>
+                  <a:cs typeface="Roboto"/>
+                  <a:sym typeface="Roboto"/>
+                </a:rPr>
+                <a:t>The FIltered and relevant nouns are indexed in the dictionary along with the file name in which it exists</a:t>
+              </a:r>
+              <a:endParaRPr b="1" sz="1200">
+                <a:solidFill>
+                  <a:schemeClr val="dk1"/>
+                </a:solidFill>
+                <a:latin typeface="Roboto"/>
+                <a:ea typeface="Roboto"/>
+                <a:cs typeface="Roboto"/>
+                <a:sym typeface="Roboto"/>
+              </a:endParaRPr>
+            </a:p>
+          </p:txBody>
+        </p:sp>
+        <p:cxnSp>
+          <p:nvCxnSpPr>
+            <p:cNvPr id="138" name="Google Shape;138;p19"/>
+            <p:cNvCxnSpPr/>
+            <p:nvPr/>
+          </p:nvCxnSpPr>
+          <p:spPr>
+            <a:xfrm>
+              <a:off x="5209825" y="3648300"/>
+              <a:ext cx="1286700" cy="0"/>
+            </a:xfrm>
+            <a:prstGeom prst="straightConnector1">
+              <a:avLst/>
+            </a:prstGeom>
+            <a:noFill/>
+            <a:ln cap="flat" cmpd="sng" w="9525">
+              <a:solidFill>
+                <a:srgbClr val="1B786F"/>
+              </a:solidFill>
+              <a:prstDash val="solid"/>
+              <a:round/>
+              <a:headEnd len="sm" w="sm" type="none"/>
+              <a:tailEnd len="med" w="med" type="oval"/>
+            </a:ln>
+          </p:spPr>
+        </p:cxnSp>
+      </p:grpSp>
     </p:spTree>
   </p:cSld>
   <p:clrMapOvr>
@@ -9054,7 +10570,7 @@
   <p:cSld>
     <p:spTree>
       <p:nvGrpSpPr>
-        <p:cNvPr id="105" name="Shape 105"/>
+        <p:cNvPr id="142" name="Shape 142"/>
         <p:cNvGrpSpPr/>
         <p:nvPr/>
       </p:nvGrpSpPr>
@@ -9068,7 +10584,7 @@
       </p:grpSpPr>
       <p:sp>
         <p:nvSpPr>
-          <p:cNvPr id="106" name="Google Shape;106;p20"/>
+          <p:cNvPr id="143" name="Google Shape;143;p20"/>
           <p:cNvSpPr txBox="1"/>
           <p:nvPr>
             <p:ph type="title"/>
@@ -9108,7 +10624,7 @@
       </p:sp>
       <p:pic>
         <p:nvPicPr>
-          <p:cNvPr id="107" name="Google Shape;107;p20"/>
+          <p:cNvPr id="144" name="Google Shape;144;p20"/>
           <p:cNvPicPr preferRelativeResize="0"/>
           <p:nvPr/>
         </p:nvPicPr>
@@ -9147,7 +10663,7 @@
   <p:cSld>
     <p:spTree>
       <p:nvGrpSpPr>
-        <p:cNvPr id="111" name="Shape 111"/>
+        <p:cNvPr id="148" name="Shape 148"/>
         <p:cNvGrpSpPr/>
         <p:nvPr/>
       </p:nvGrpSpPr>
@@ -9161,7 +10677,7 @@
       </p:grpSpPr>
       <p:sp>
         <p:nvSpPr>
-          <p:cNvPr id="112" name="Google Shape;112;p21"/>
+          <p:cNvPr id="149" name="Google Shape;149;p21"/>
           <p:cNvSpPr txBox="1"/>
           <p:nvPr>
             <p:ph type="title"/>
@@ -9205,7 +10721,7 @@
       </p:sp>
       <p:pic>
         <p:nvPicPr>
-          <p:cNvPr id="113" name="Google Shape;113;p21"/>
+          <p:cNvPr id="150" name="Google Shape;150;p21"/>
           <p:cNvPicPr preferRelativeResize="0"/>
           <p:nvPr/>
         </p:nvPicPr>
@@ -9240,6 +10756,285 @@
 </file>
 
 <file path=ppt/theme/theme1.xml><?xml version="1.0" encoding="utf-8"?>
+<a:theme xmlns:a="http://schemas.openxmlformats.org/drawingml/2006/main" xmlns:r="http://schemas.openxmlformats.org/officeDocument/2006/relationships" name="Marina">
+  <a:themeElements>
+    <a:clrScheme name="Marina">
+      <a:dk1>
+        <a:srgbClr val="FFFFFF"/>
+      </a:dk1>
+      <a:lt1>
+        <a:srgbClr val="00517C"/>
+      </a:lt1>
+      <a:dk2>
+        <a:srgbClr val="004065"/>
+      </a:dk2>
+      <a:lt2>
+        <a:srgbClr val="CFD8DC"/>
+      </a:lt2>
+      <a:accent1>
+        <a:srgbClr val="0277BD"/>
+      </a:accent1>
+      <a:accent2>
+        <a:srgbClr val="558B2F"/>
+      </a:accent2>
+      <a:accent3>
+        <a:srgbClr val="009688"/>
+      </a:accent3>
+      <a:accent4>
+        <a:srgbClr val="039BE5"/>
+      </a:accent4>
+      <a:accent5>
+        <a:srgbClr val="8BC34A"/>
+      </a:accent5>
+      <a:accent6>
+        <a:srgbClr val="FFEB38"/>
+      </a:accent6>
+      <a:hlink>
+        <a:srgbClr val="8BC34A"/>
+      </a:hlink>
+      <a:folHlink>
+        <a:srgbClr val="8BC34A"/>
+      </a:folHlink>
+    </a:clrScheme>
+    <a:fontScheme name="Office">
+      <a:majorFont>
+        <a:latin typeface="Arial"/>
+        <a:ea typeface=""/>
+        <a:cs typeface=""/>
+        <a:font script="Jpan" typeface="ＭＳ Ｐゴシック"/>
+        <a:font script="Hang" typeface="맑은 고딕"/>
+        <a:font script="Hans" typeface="宋体"/>
+        <a:font script="Hant" typeface="新細明體"/>
+        <a:font script="Arab" typeface="Times New Roman"/>
+        <a:font script="Hebr" typeface="Times New Roman"/>
+        <a:font script="Thai" typeface="Angsana New"/>
+        <a:font script="Ethi" typeface="Nyala"/>
+        <a:font script="Beng" typeface="Vrinda"/>
+        <a:font script="Gujr" typeface="Shruti"/>
+        <a:font script="Khmr" typeface="MoolBoran"/>
+        <a:font script="Knda" typeface="Tunga"/>
+        <a:font script="Guru" typeface="Raavi"/>
+        <a:font script="Cans" typeface="Euphemia"/>
+        <a:font script="Cher" typeface="Plantagenet Cherokee"/>
+        <a:font script="Yiii" typeface="Microsoft Yi Baiti"/>
+        <a:font script="Tibt" typeface="Microsoft Himalaya"/>
+        <a:font script="Thaa" typeface="MV Boli"/>
+        <a:font script="Deva" typeface="Mangal"/>
+        <a:font script="Telu" typeface="Gautami"/>
+        <a:font script="Taml" typeface="Latha"/>
+        <a:font script="Syrc" typeface="Estrangelo Edessa"/>
+        <a:font script="Orya" typeface="Kalinga"/>
+        <a:font script="Mlym" typeface="Kartika"/>
+        <a:font script="Laoo" typeface="DokChampa"/>
+        <a:font script="Sinh" typeface="Iskoola Pota"/>
+        <a:font script="Mong" typeface="Mongolian Baiti"/>
+        <a:font script="Viet" typeface="Times New Roman"/>
+        <a:font script="Uigh" typeface="Microsoft Uighur"/>
+        <a:font script="Geor" typeface="Sylfaen"/>
+      </a:majorFont>
+      <a:minorFont>
+        <a:latin typeface="Arial"/>
+        <a:ea typeface=""/>
+        <a:cs typeface=""/>
+        <a:font script="Jpan" typeface="ＭＳ Ｐゴシック"/>
+        <a:font script="Hang" typeface="맑은 고딕"/>
+        <a:font script="Hans" typeface="宋体"/>
+        <a:font script="Hant" typeface="新細明體"/>
+        <a:font script="Arab" typeface="Arial"/>
+        <a:font script="Hebr" typeface="Arial"/>
+        <a:font script="Thai" typeface="Cordia New"/>
+        <a:font script="Ethi" typeface="Nyala"/>
+        <a:font script="Beng" typeface="Vrinda"/>
+        <a:font script="Gujr" typeface="Shruti"/>
+        <a:font script="Khmr" typeface="DaunPenh"/>
+        <a:font script="Knda" typeface="Tunga"/>
+        <a:font script="Guru" typeface="Raavi"/>
+        <a:font script="Cans" typeface="Euphemia"/>
+        <a:font script="Cher" typeface="Plantagenet Cherokee"/>
+        <a:font script="Yiii" typeface="Microsoft Yi Baiti"/>
+        <a:font script="Tibt" typeface="Microsoft Himalaya"/>
+        <a:font script="Thaa" typeface="MV Boli"/>
+        <a:font script="Deva" typeface="Mangal"/>
+        <a:font script="Telu" typeface="Gautami"/>
+        <a:font script="Taml" typeface="Latha"/>
+        <a:font script="Syrc" typeface="Estrangelo Edessa"/>
+        <a:font script="Orya" typeface="Kalinga"/>
+        <a:font script="Mlym" typeface="Kartika"/>
+        <a:font script="Laoo" typeface="DokChampa"/>
+        <a:font script="Sinh" typeface="Iskoola Pota"/>
+        <a:font script="Mong" typeface="Mongolian Baiti"/>
+        <a:font script="Viet" typeface="Arial"/>
+        <a:font script="Uigh" typeface="Microsoft Uighur"/>
+        <a:font script="Geor" typeface="Sylfaen"/>
+      </a:minorFont>
+    </a:fontScheme>
+    <a:fmtScheme name="Office">
+      <a:fillStyleLst>
+        <a:solidFill>
+          <a:schemeClr val="phClr"/>
+        </a:solidFill>
+        <a:gradFill rotWithShape="1">
+          <a:gsLst>
+            <a:gs pos="0">
+              <a:schemeClr val="phClr">
+                <a:tint val="50000"/>
+                <a:satMod val="300000"/>
+              </a:schemeClr>
+            </a:gs>
+            <a:gs pos="35000">
+              <a:schemeClr val="phClr">
+                <a:tint val="37000"/>
+                <a:satMod val="300000"/>
+              </a:schemeClr>
+            </a:gs>
+            <a:gs pos="100000">
+              <a:schemeClr val="phClr">
+                <a:tint val="15000"/>
+                <a:satMod val="350000"/>
+              </a:schemeClr>
+            </a:gs>
+          </a:gsLst>
+          <a:lin ang="16200000" scaled="1"/>
+        </a:gradFill>
+        <a:gradFill rotWithShape="1">
+          <a:gsLst>
+            <a:gs pos="0">
+              <a:schemeClr val="phClr">
+                <a:tint val="100000"/>
+                <a:shade val="100000"/>
+                <a:satMod val="130000"/>
+              </a:schemeClr>
+            </a:gs>
+            <a:gs pos="100000">
+              <a:schemeClr val="phClr">
+                <a:tint val="50000"/>
+                <a:shade val="100000"/>
+                <a:satMod val="350000"/>
+              </a:schemeClr>
+            </a:gs>
+          </a:gsLst>
+          <a:lin ang="16200000" scaled="0"/>
+        </a:gradFill>
+      </a:fillStyleLst>
+      <a:lnStyleLst>
+        <a:ln w="9525" cap="flat" cmpd="sng" algn="ctr">
+          <a:solidFill>
+            <a:schemeClr val="phClr">
+              <a:shade val="95000"/>
+              <a:satMod val="105000"/>
+            </a:schemeClr>
+          </a:solidFill>
+          <a:prstDash val="solid"/>
+        </a:ln>
+        <a:ln w="25400" cap="flat" cmpd="sng" algn="ctr">
+          <a:solidFill>
+            <a:schemeClr val="phClr"/>
+          </a:solidFill>
+          <a:prstDash val="solid"/>
+        </a:ln>
+        <a:ln w="38100" cap="flat" cmpd="sng" algn="ctr">
+          <a:solidFill>
+            <a:schemeClr val="phClr"/>
+          </a:solidFill>
+          <a:prstDash val="solid"/>
+        </a:ln>
+      </a:lnStyleLst>
+      <a:effectStyleLst>
+        <a:effectStyle>
+          <a:effectLst>
+            <a:outerShdw blurRad="40000" dist="20000" dir="5400000" rotWithShape="0">
+              <a:srgbClr val="000000">
+                <a:alpha val="38000"/>
+              </a:srgbClr>
+            </a:outerShdw>
+          </a:effectLst>
+        </a:effectStyle>
+        <a:effectStyle>
+          <a:effectLst>
+            <a:outerShdw blurRad="40000" dist="23000" dir="5400000" rotWithShape="0">
+              <a:srgbClr val="000000">
+                <a:alpha val="35000"/>
+              </a:srgbClr>
+            </a:outerShdw>
+          </a:effectLst>
+        </a:effectStyle>
+        <a:effectStyle>
+          <a:effectLst>
+            <a:outerShdw blurRad="40000" dist="23000" dir="5400000" rotWithShape="0">
+              <a:srgbClr val="000000">
+                <a:alpha val="35000"/>
+              </a:srgbClr>
+            </a:outerShdw>
+          </a:effectLst>
+          <a:scene3d>
+            <a:camera prst="orthographicFront">
+              <a:rot lat="0" lon="0" rev="0"/>
+            </a:camera>
+            <a:lightRig rig="threePt" dir="t">
+              <a:rot lat="0" lon="0" rev="1200000"/>
+            </a:lightRig>
+          </a:scene3d>
+          <a:sp3d>
+            <a:bevelT w="63500" h="25400"/>
+          </a:sp3d>
+        </a:effectStyle>
+      </a:effectStyleLst>
+      <a:bgFillStyleLst>
+        <a:solidFill>
+          <a:schemeClr val="phClr"/>
+        </a:solidFill>
+        <a:gradFill rotWithShape="1">
+          <a:gsLst>
+            <a:gs pos="0">
+              <a:schemeClr val="phClr">
+                <a:tint val="40000"/>
+                <a:satMod val="350000"/>
+              </a:schemeClr>
+            </a:gs>
+            <a:gs pos="40000">
+              <a:schemeClr val="phClr">
+                <a:tint val="45000"/>
+                <a:shade val="99000"/>
+                <a:satMod val="350000"/>
+              </a:schemeClr>
+            </a:gs>
+            <a:gs pos="100000">
+              <a:schemeClr val="phClr">
+                <a:shade val="20000"/>
+                <a:satMod val="255000"/>
+              </a:schemeClr>
+            </a:gs>
+          </a:gsLst>
+          <a:path path="circle">
+            <a:fillToRect l="50000" t="-80000" r="50000" b="180000"/>
+          </a:path>
+        </a:gradFill>
+        <a:gradFill rotWithShape="1">
+          <a:gsLst>
+            <a:gs pos="0">
+              <a:schemeClr val="phClr">
+                <a:tint val="80000"/>
+                <a:satMod val="300000"/>
+              </a:schemeClr>
+            </a:gs>
+            <a:gs pos="100000">
+              <a:schemeClr val="phClr">
+                <a:shade val="30000"/>
+                <a:satMod val="200000"/>
+              </a:schemeClr>
+            </a:gs>
+          </a:gsLst>
+          <a:path path="circle">
+            <a:fillToRect l="50000" t="50000" r="50000" b="50000"/>
+          </a:path>
+        </a:gradFill>
+      </a:bgFillStyleLst>
+    </a:fmtScheme>
+  </a:themeElements>
+</a:theme>
+</file>
+
+<file path=ppt/theme/theme2.xml><?xml version="1.0" encoding="utf-8"?>
 <a:theme xmlns:a="http://schemas.openxmlformats.org/drawingml/2006/main" xmlns:r="http://schemas.openxmlformats.org/officeDocument/2006/relationships">
   <a:themeElements>
     <a:clrScheme name="Default">
@@ -9516,283 +11311,4 @@
     </a:fmtScheme>
   </a:themeElements>
 </a:theme>
-</file>
-
-<file path=ppt/theme/theme2.xml><?xml version="1.0" encoding="utf-8"?>
-<a:theme xmlns:a="http://schemas.openxmlformats.org/drawingml/2006/main" xmlns:r="http://schemas.openxmlformats.org/officeDocument/2006/relationships" name="Marina">
-  <a:themeElements>
-    <a:clrScheme name="Marina">
-      <a:dk1>
-        <a:srgbClr val="FFFFFF"/>
-      </a:dk1>
-      <a:lt1>
-        <a:srgbClr val="00517C"/>
-      </a:lt1>
-      <a:dk2>
-        <a:srgbClr val="004065"/>
-      </a:dk2>
-      <a:lt2>
-        <a:srgbClr val="CFD8DC"/>
-      </a:lt2>
-      <a:accent1>
-        <a:srgbClr val="0277BD"/>
-      </a:accent1>
-      <a:accent2>
-        <a:srgbClr val="558B2F"/>
-      </a:accent2>
-      <a:accent3>
-        <a:srgbClr val="009688"/>
-      </a:accent3>
-      <a:accent4>
-        <a:srgbClr val="039BE5"/>
-      </a:accent4>
-      <a:accent5>
-        <a:srgbClr val="8BC34A"/>
-      </a:accent5>
-      <a:accent6>
-        <a:srgbClr val="FFEB38"/>
-      </a:accent6>
-      <a:hlink>
-        <a:srgbClr val="8BC34A"/>
-      </a:hlink>
-      <a:folHlink>
-        <a:srgbClr val="8BC34A"/>
-      </a:folHlink>
-    </a:clrScheme>
-    <a:fontScheme name="Office">
-      <a:majorFont>
-        <a:latin typeface="Arial"/>
-        <a:ea typeface=""/>
-        <a:cs typeface=""/>
-        <a:font script="Jpan" typeface="ＭＳ Ｐゴシック"/>
-        <a:font script="Hang" typeface="맑은 고딕"/>
-        <a:font script="Hans" typeface="宋体"/>
-        <a:font script="Hant" typeface="新細明體"/>
-        <a:font script="Arab" typeface="Times New Roman"/>
-        <a:font script="Hebr" typeface="Times New Roman"/>
-        <a:font script="Thai" typeface="Angsana New"/>
-        <a:font script="Ethi" typeface="Nyala"/>
-        <a:font script="Beng" typeface="Vrinda"/>
-        <a:font script="Gujr" typeface="Shruti"/>
-        <a:font script="Khmr" typeface="MoolBoran"/>
-        <a:font script="Knda" typeface="Tunga"/>
-        <a:font script="Guru" typeface="Raavi"/>
-        <a:font script="Cans" typeface="Euphemia"/>
-        <a:font script="Cher" typeface="Plantagenet Cherokee"/>
-        <a:font script="Yiii" typeface="Microsoft Yi Baiti"/>
-        <a:font script="Tibt" typeface="Microsoft Himalaya"/>
-        <a:font script="Thaa" typeface="MV Boli"/>
-        <a:font script="Deva" typeface="Mangal"/>
-        <a:font script="Telu" typeface="Gautami"/>
-        <a:font script="Taml" typeface="Latha"/>
-        <a:font script="Syrc" typeface="Estrangelo Edessa"/>
-        <a:font script="Orya" typeface="Kalinga"/>
-        <a:font script="Mlym" typeface="Kartika"/>
-        <a:font script="Laoo" typeface="DokChampa"/>
-        <a:font script="Sinh" typeface="Iskoola Pota"/>
-        <a:font script="Mong" typeface="Mongolian Baiti"/>
-        <a:font script="Viet" typeface="Times New Roman"/>
-        <a:font script="Uigh" typeface="Microsoft Uighur"/>
-        <a:font script="Geor" typeface="Sylfaen"/>
-      </a:majorFont>
-      <a:minorFont>
-        <a:latin typeface="Arial"/>
-        <a:ea typeface=""/>
-        <a:cs typeface=""/>
-        <a:font script="Jpan" typeface="ＭＳ Ｐゴシック"/>
-        <a:font script="Hang" typeface="맑은 고딕"/>
-        <a:font script="Hans" typeface="宋体"/>
-        <a:font script="Hant" typeface="新細明體"/>
-        <a:font script="Arab" typeface="Arial"/>
-        <a:font script="Hebr" typeface="Arial"/>
-        <a:font script="Thai" typeface="Cordia New"/>
-        <a:font script="Ethi" typeface="Nyala"/>
-        <a:font script="Beng" typeface="Vrinda"/>
-        <a:font script="Gujr" typeface="Shruti"/>
-        <a:font script="Khmr" typeface="DaunPenh"/>
-        <a:font script="Knda" typeface="Tunga"/>
-        <a:font script="Guru" typeface="Raavi"/>
-        <a:font script="Cans" typeface="Euphemia"/>
-        <a:font script="Cher" typeface="Plantagenet Cherokee"/>
-        <a:font script="Yiii" typeface="Microsoft Yi Baiti"/>
-        <a:font script="Tibt" typeface="Microsoft Himalaya"/>
-        <a:font script="Thaa" typeface="MV Boli"/>
-        <a:font script="Deva" typeface="Mangal"/>
-        <a:font script="Telu" typeface="Gautami"/>
-        <a:font script="Taml" typeface="Latha"/>
-        <a:font script="Syrc" typeface="Estrangelo Edessa"/>
-        <a:font script="Orya" typeface="Kalinga"/>
-        <a:font script="Mlym" typeface="Kartika"/>
-        <a:font script="Laoo" typeface="DokChampa"/>
-        <a:font script="Sinh" typeface="Iskoola Pota"/>
-        <a:font script="Mong" typeface="Mongolian Baiti"/>
-        <a:font script="Viet" typeface="Arial"/>
-        <a:font script="Uigh" typeface="Microsoft Uighur"/>
-        <a:font script="Geor" typeface="Sylfaen"/>
-      </a:minorFont>
-    </a:fontScheme>
-    <a:fmtScheme name="Office">
-      <a:fillStyleLst>
-        <a:solidFill>
-          <a:schemeClr val="phClr"/>
-        </a:solidFill>
-        <a:gradFill rotWithShape="1">
-          <a:gsLst>
-            <a:gs pos="0">
-              <a:schemeClr val="phClr">
-                <a:tint val="50000"/>
-                <a:satMod val="300000"/>
-              </a:schemeClr>
-            </a:gs>
-            <a:gs pos="35000">
-              <a:schemeClr val="phClr">
-                <a:tint val="37000"/>
-                <a:satMod val="300000"/>
-              </a:schemeClr>
-            </a:gs>
-            <a:gs pos="100000">
-              <a:schemeClr val="phClr">
-                <a:tint val="15000"/>
-                <a:satMod val="350000"/>
-              </a:schemeClr>
-            </a:gs>
-          </a:gsLst>
-          <a:lin ang="16200000" scaled="1"/>
-        </a:gradFill>
-        <a:gradFill rotWithShape="1">
-          <a:gsLst>
-            <a:gs pos="0">
-              <a:schemeClr val="phClr">
-                <a:tint val="100000"/>
-                <a:shade val="100000"/>
-                <a:satMod val="130000"/>
-              </a:schemeClr>
-            </a:gs>
-            <a:gs pos="100000">
-              <a:schemeClr val="phClr">
-                <a:tint val="50000"/>
-                <a:shade val="100000"/>
-                <a:satMod val="350000"/>
-              </a:schemeClr>
-            </a:gs>
-          </a:gsLst>
-          <a:lin ang="16200000" scaled="0"/>
-        </a:gradFill>
-      </a:fillStyleLst>
-      <a:lnStyleLst>
-        <a:ln w="9525" cap="flat" cmpd="sng" algn="ctr">
-          <a:solidFill>
-            <a:schemeClr val="phClr">
-              <a:shade val="95000"/>
-              <a:satMod val="105000"/>
-            </a:schemeClr>
-          </a:solidFill>
-          <a:prstDash val="solid"/>
-        </a:ln>
-        <a:ln w="25400" cap="flat" cmpd="sng" algn="ctr">
-          <a:solidFill>
-            <a:schemeClr val="phClr"/>
-          </a:solidFill>
-          <a:prstDash val="solid"/>
-        </a:ln>
-        <a:ln w="38100" cap="flat" cmpd="sng" algn="ctr">
-          <a:solidFill>
-            <a:schemeClr val="phClr"/>
-          </a:solidFill>
-          <a:prstDash val="solid"/>
-        </a:ln>
-      </a:lnStyleLst>
-      <a:effectStyleLst>
-        <a:effectStyle>
-          <a:effectLst>
-            <a:outerShdw blurRad="40000" dist="20000" dir="5400000" rotWithShape="0">
-              <a:srgbClr val="000000">
-                <a:alpha val="38000"/>
-              </a:srgbClr>
-            </a:outerShdw>
-          </a:effectLst>
-        </a:effectStyle>
-        <a:effectStyle>
-          <a:effectLst>
-            <a:outerShdw blurRad="40000" dist="23000" dir="5400000" rotWithShape="0">
-              <a:srgbClr val="000000">
-                <a:alpha val="35000"/>
-              </a:srgbClr>
-            </a:outerShdw>
-          </a:effectLst>
-        </a:effectStyle>
-        <a:effectStyle>
-          <a:effectLst>
-            <a:outerShdw blurRad="40000" dist="23000" dir="5400000" rotWithShape="0">
-              <a:srgbClr val="000000">
-                <a:alpha val="35000"/>
-              </a:srgbClr>
-            </a:outerShdw>
-          </a:effectLst>
-          <a:scene3d>
-            <a:camera prst="orthographicFront">
-              <a:rot lat="0" lon="0" rev="0"/>
-            </a:camera>
-            <a:lightRig rig="threePt" dir="t">
-              <a:rot lat="0" lon="0" rev="1200000"/>
-            </a:lightRig>
-          </a:scene3d>
-          <a:sp3d>
-            <a:bevelT w="63500" h="25400"/>
-          </a:sp3d>
-        </a:effectStyle>
-      </a:effectStyleLst>
-      <a:bgFillStyleLst>
-        <a:solidFill>
-          <a:schemeClr val="phClr"/>
-        </a:solidFill>
-        <a:gradFill rotWithShape="1">
-          <a:gsLst>
-            <a:gs pos="0">
-              <a:schemeClr val="phClr">
-                <a:tint val="40000"/>
-                <a:satMod val="350000"/>
-              </a:schemeClr>
-            </a:gs>
-            <a:gs pos="40000">
-              <a:schemeClr val="phClr">
-                <a:tint val="45000"/>
-                <a:shade val="99000"/>
-                <a:satMod val="350000"/>
-              </a:schemeClr>
-            </a:gs>
-            <a:gs pos="100000">
-              <a:schemeClr val="phClr">
-                <a:shade val="20000"/>
-                <a:satMod val="255000"/>
-              </a:schemeClr>
-            </a:gs>
-          </a:gsLst>
-          <a:path path="circle">
-            <a:fillToRect l="50000" t="-80000" r="50000" b="180000"/>
-          </a:path>
-        </a:gradFill>
-        <a:gradFill rotWithShape="1">
-          <a:gsLst>
-            <a:gs pos="0">
-              <a:schemeClr val="phClr">
-                <a:tint val="80000"/>
-                <a:satMod val="300000"/>
-              </a:schemeClr>
-            </a:gs>
-            <a:gs pos="100000">
-              <a:schemeClr val="phClr">
-                <a:shade val="30000"/>
-                <a:satMod val="200000"/>
-              </a:schemeClr>
-            </a:gs>
-          </a:gsLst>
-          <a:path path="circle">
-            <a:fillToRect l="50000" t="50000" r="50000" b="50000"/>
-          </a:path>
-        </a:gradFill>
-      </a:bgFillStyleLst>
-    </a:fmtScheme>
-  </a:themeElements>
-</a:theme>
 </file>
</xml_diff>